<commit_message>
updating neural symbolic execution
</commit_message>
<xml_diff>
--- a/figures.pptx
+++ b/figures.pptx
@@ -5,7 +5,7 @@
     <p:sldMasterId id="2147483648" r:id="rId1"/>
   </p:sldMasterIdLst>
   <p:notesMasterIdLst>
-    <p:notesMasterId r:id="rId14"/>
+    <p:notesMasterId r:id="rId15"/>
   </p:notesMasterIdLst>
   <p:sldIdLst>
     <p:sldId id="256" r:id="rId2"/>
@@ -20,6 +20,7 @@
     <p:sldId id="265" r:id="rId11"/>
     <p:sldId id="266" r:id="rId12"/>
     <p:sldId id="267" r:id="rId13"/>
+    <p:sldId id="268" r:id="rId14"/>
   </p:sldIdLst>
   <p:sldSz cx="12192000" cy="6858000"/>
   <p:notesSz cx="6858000" cy="9144000"/>
@@ -208,7 +209,7 @@
           <a:p>
             <a:fld id="{20262184-5CA4-4F35-880A-30BBB5DC7B35}" type="datetimeFigureOut">
               <a:rPr lang="en-US" smtClean="0"/>
-              <a:t>9/28/2022</a:t>
+              <a:t>9/30/2022</a:t>
             </a:fld>
             <a:endParaRPr lang="en-US"/>
           </a:p>
@@ -833,6 +834,90 @@
 </p:notes>
 </file>
 
+<file path=ppt/notesSlides/notesSlide5.xml><?xml version="1.0" encoding="utf-8"?>
+<p:notes xmlns:a="http://schemas.openxmlformats.org/drawingml/2006/main" xmlns:r="http://schemas.openxmlformats.org/officeDocument/2006/relationships" xmlns:p="http://schemas.openxmlformats.org/presentationml/2006/main">
+  <p:cSld>
+    <p:spTree>
+      <p:nvGrpSpPr>
+        <p:cNvPr id="1" name=""/>
+        <p:cNvGrpSpPr/>
+        <p:nvPr/>
+      </p:nvGrpSpPr>
+      <p:grpSpPr>
+        <a:xfrm>
+          <a:off x="0" y="0"/>
+          <a:ext cx="0" cy="0"/>
+          <a:chOff x="0" y="0"/>
+          <a:chExt cx="0" cy="0"/>
+        </a:xfrm>
+      </p:grpSpPr>
+      <p:sp>
+        <p:nvSpPr>
+          <p:cNvPr id="2" name="Slide Image Placeholder 1"/>
+          <p:cNvSpPr>
+            <a:spLocks noGrp="1" noRot="1" noChangeAspect="1"/>
+          </p:cNvSpPr>
+          <p:nvPr>
+            <p:ph type="sldImg"/>
+          </p:nvPr>
+        </p:nvSpPr>
+        <p:spPr/>
+      </p:sp>
+      <p:sp>
+        <p:nvSpPr>
+          <p:cNvPr id="3" name="Notes Placeholder 2"/>
+          <p:cNvSpPr>
+            <a:spLocks noGrp="1"/>
+          </p:cNvSpPr>
+          <p:nvPr>
+            <p:ph type="body" idx="1"/>
+          </p:nvPr>
+        </p:nvSpPr>
+        <p:spPr/>
+        <p:txBody>
+          <a:bodyPr/>
+          <a:lstStyle/>
+          <a:p>
+            <a:endParaRPr lang="en-US" dirty="0"/>
+          </a:p>
+        </p:txBody>
+      </p:sp>
+      <p:sp>
+        <p:nvSpPr>
+          <p:cNvPr id="4" name="Slide Number Placeholder 3"/>
+          <p:cNvSpPr>
+            <a:spLocks noGrp="1"/>
+          </p:cNvSpPr>
+          <p:nvPr>
+            <p:ph type="sldNum" sz="quarter" idx="5"/>
+          </p:nvPr>
+        </p:nvSpPr>
+        <p:spPr/>
+        <p:txBody>
+          <a:bodyPr/>
+          <a:lstStyle/>
+          <a:p>
+            <a:fld id="{4DDBCBF5-78E0-4D21-B370-F8D7AF8518EF}" type="slidenum">
+              <a:rPr lang="en-US" smtClean="0"/>
+              <a:t>13</a:t>
+            </a:fld>
+            <a:endParaRPr lang="en-US"/>
+          </a:p>
+        </p:txBody>
+      </p:sp>
+    </p:spTree>
+    <p:extLst>
+      <p:ext uri="{BB962C8B-B14F-4D97-AF65-F5344CB8AC3E}">
+        <p14:creationId xmlns:p14="http://schemas.microsoft.com/office/powerpoint/2010/main" val="3336099685"/>
+      </p:ext>
+    </p:extLst>
+  </p:cSld>
+  <p:clrMapOvr>
+    <a:masterClrMapping/>
+  </p:clrMapOvr>
+</p:notes>
+</file>
+
 <file path=ppt/slideLayouts/slideLayout1.xml><?xml version="1.0" encoding="utf-8"?>
 <p:sldLayout xmlns:a="http://schemas.openxmlformats.org/drawingml/2006/main" xmlns:r="http://schemas.openxmlformats.org/officeDocument/2006/relationships" xmlns:p="http://schemas.openxmlformats.org/presentationml/2006/main" type="title" preserve="1">
   <p:cSld name="Title Slide">
@@ -980,7 +1065,7 @@
           <a:p>
             <a:fld id="{C05BBA32-449C-4446-82D0-207D21EE8989}" type="datetimeFigureOut">
               <a:rPr lang="en-US" smtClean="0"/>
-              <a:t>9/28/2022</a:t>
+              <a:t>9/30/2022</a:t>
             </a:fld>
             <a:endParaRPr lang="en-US"/>
           </a:p>
@@ -1178,7 +1263,7 @@
           <a:p>
             <a:fld id="{C05BBA32-449C-4446-82D0-207D21EE8989}" type="datetimeFigureOut">
               <a:rPr lang="en-US" smtClean="0"/>
-              <a:t>9/28/2022</a:t>
+              <a:t>9/30/2022</a:t>
             </a:fld>
             <a:endParaRPr lang="en-US"/>
           </a:p>
@@ -1386,7 +1471,7 @@
           <a:p>
             <a:fld id="{C05BBA32-449C-4446-82D0-207D21EE8989}" type="datetimeFigureOut">
               <a:rPr lang="en-US" smtClean="0"/>
-              <a:t>9/28/2022</a:t>
+              <a:t>9/30/2022</a:t>
             </a:fld>
             <a:endParaRPr lang="en-US"/>
           </a:p>
@@ -1584,7 +1669,7 @@
           <a:p>
             <a:fld id="{C05BBA32-449C-4446-82D0-207D21EE8989}" type="datetimeFigureOut">
               <a:rPr lang="en-US" smtClean="0"/>
-              <a:t>9/28/2022</a:t>
+              <a:t>9/30/2022</a:t>
             </a:fld>
             <a:endParaRPr lang="en-US"/>
           </a:p>
@@ -1859,7 +1944,7 @@
           <a:p>
             <a:fld id="{C05BBA32-449C-4446-82D0-207D21EE8989}" type="datetimeFigureOut">
               <a:rPr lang="en-US" smtClean="0"/>
-              <a:t>9/28/2022</a:t>
+              <a:t>9/30/2022</a:t>
             </a:fld>
             <a:endParaRPr lang="en-US"/>
           </a:p>
@@ -2124,7 +2209,7 @@
           <a:p>
             <a:fld id="{C05BBA32-449C-4446-82D0-207D21EE8989}" type="datetimeFigureOut">
               <a:rPr lang="en-US" smtClean="0"/>
-              <a:t>9/28/2022</a:t>
+              <a:t>9/30/2022</a:t>
             </a:fld>
             <a:endParaRPr lang="en-US"/>
           </a:p>
@@ -2536,7 +2621,7 @@
           <a:p>
             <a:fld id="{C05BBA32-449C-4446-82D0-207D21EE8989}" type="datetimeFigureOut">
               <a:rPr lang="en-US" smtClean="0"/>
-              <a:t>9/28/2022</a:t>
+              <a:t>9/30/2022</a:t>
             </a:fld>
             <a:endParaRPr lang="en-US"/>
           </a:p>
@@ -2677,7 +2762,7 @@
           <a:p>
             <a:fld id="{C05BBA32-449C-4446-82D0-207D21EE8989}" type="datetimeFigureOut">
               <a:rPr lang="en-US" smtClean="0"/>
-              <a:t>9/28/2022</a:t>
+              <a:t>9/30/2022</a:t>
             </a:fld>
             <a:endParaRPr lang="en-US"/>
           </a:p>
@@ -2790,7 +2875,7 @@
           <a:p>
             <a:fld id="{C05BBA32-449C-4446-82D0-207D21EE8989}" type="datetimeFigureOut">
               <a:rPr lang="en-US" smtClean="0"/>
-              <a:t>9/28/2022</a:t>
+              <a:t>9/30/2022</a:t>
             </a:fld>
             <a:endParaRPr lang="en-US"/>
           </a:p>
@@ -3101,7 +3186,7 @@
           <a:p>
             <a:fld id="{C05BBA32-449C-4446-82D0-207D21EE8989}" type="datetimeFigureOut">
               <a:rPr lang="en-US" smtClean="0"/>
-              <a:t>9/28/2022</a:t>
+              <a:t>9/30/2022</a:t>
             </a:fld>
             <a:endParaRPr lang="en-US"/>
           </a:p>
@@ -3389,7 +3474,7 @@
           <a:p>
             <a:fld id="{C05BBA32-449C-4446-82D0-207D21EE8989}" type="datetimeFigureOut">
               <a:rPr lang="en-US" smtClean="0"/>
-              <a:t>9/28/2022</a:t>
+              <a:t>9/30/2022</a:t>
             </a:fld>
             <a:endParaRPr lang="en-US"/>
           </a:p>
@@ -3630,7 +3715,7 @@
           <a:p>
             <a:fld id="{C05BBA32-449C-4446-82D0-207D21EE8989}" type="datetimeFigureOut">
               <a:rPr lang="en-US" smtClean="0"/>
-              <a:t>9/28/2022</a:t>
+              <a:t>9/30/2022</a:t>
             </a:fld>
             <a:endParaRPr lang="en-US"/>
           </a:p>
@@ -13821,6 +13906,3461 @@
     <p:extLst>
       <p:ext uri="{BB962C8B-B14F-4D97-AF65-F5344CB8AC3E}">
         <p14:creationId xmlns:p14="http://schemas.microsoft.com/office/powerpoint/2010/main" val="2820828355"/>
+      </p:ext>
+    </p:extLst>
+  </p:cSld>
+  <p:clrMapOvr>
+    <a:masterClrMapping/>
+  </p:clrMapOvr>
+</p:sld>
+</file>
+
+<file path=ppt/slides/slide13.xml><?xml version="1.0" encoding="utf-8"?>
+<p:sld xmlns:a="http://schemas.openxmlformats.org/drawingml/2006/main" xmlns:r="http://schemas.openxmlformats.org/officeDocument/2006/relationships" xmlns:p="http://schemas.openxmlformats.org/presentationml/2006/main">
+  <p:cSld>
+    <p:spTree>
+      <p:nvGrpSpPr>
+        <p:cNvPr id="1" name=""/>
+        <p:cNvGrpSpPr/>
+        <p:nvPr/>
+      </p:nvGrpSpPr>
+      <p:grpSpPr>
+        <a:xfrm>
+          <a:off x="0" y="0"/>
+          <a:ext cx="0" cy="0"/>
+          <a:chOff x="0" y="0"/>
+          <a:chExt cx="0" cy="0"/>
+        </a:xfrm>
+      </p:grpSpPr>
+      <p:grpSp>
+        <p:nvGrpSpPr>
+          <p:cNvPr id="22" name="Group 21">
+            <a:extLst>
+              <a:ext uri="{FF2B5EF4-FFF2-40B4-BE49-F238E27FC236}">
+                <a16:creationId xmlns:a16="http://schemas.microsoft.com/office/drawing/2014/main" id="{F2817352-03E6-2FBC-A904-DC7F614F93A4}"/>
+              </a:ext>
+            </a:extLst>
+          </p:cNvPr>
+          <p:cNvGrpSpPr/>
+          <p:nvPr/>
+        </p:nvGrpSpPr>
+        <p:grpSpPr>
+          <a:xfrm>
+            <a:off x="2440606" y="2552234"/>
+            <a:ext cx="4314034" cy="2556068"/>
+            <a:chOff x="1929388" y="102269"/>
+            <a:chExt cx="4314034" cy="2556068"/>
+          </a:xfrm>
+        </p:grpSpPr>
+        <p:pic>
+          <p:nvPicPr>
+            <p:cNvPr id="1026" name="Picture 2" descr="24 hand drawings by rowen silver">
+              <a:extLst>
+                <a:ext uri="{FF2B5EF4-FFF2-40B4-BE49-F238E27FC236}">
+                  <a16:creationId xmlns:a16="http://schemas.microsoft.com/office/drawing/2014/main" id="{83907CBB-79B5-3AAB-3490-C24E89B3BBE5}"/>
+                </a:ext>
+              </a:extLst>
+            </p:cNvPr>
+            <p:cNvPicPr>
+              <a:picLocks noChangeAspect="1" noChangeArrowheads="1"/>
+            </p:cNvPicPr>
+            <p:nvPr/>
+          </p:nvPicPr>
+          <p:blipFill rotWithShape="1">
+            <a:blip r:embed="rId3">
+              <a:extLst>
+                <a:ext uri="{28A0092B-C50C-407E-A947-70E740481C1C}">
+                  <a14:useLocalDpi xmlns:a14="http://schemas.microsoft.com/office/drawing/2010/main" val="0"/>
+                </a:ext>
+              </a:extLst>
+            </a:blip>
+            <a:srcRect t="1671" r="1" b="1"/>
+            <a:stretch/>
+          </p:blipFill>
+          <p:spPr bwMode="auto">
+            <a:xfrm>
+              <a:off x="2785311" y="102269"/>
+              <a:ext cx="3458111" cy="2556068"/>
+            </a:xfrm>
+            <a:custGeom>
+              <a:avLst/>
+              <a:gdLst/>
+              <a:ahLst/>
+              <a:cxnLst/>
+              <a:rect l="l" t="t" r="r" b="b"/>
+              <a:pathLst>
+                <a:path w="8279548" h="6044817">
+                  <a:moveTo>
+                    <a:pt x="8670" y="3353401"/>
+                  </a:moveTo>
+                  <a:lnTo>
+                    <a:pt x="9145" y="3371492"/>
+                  </a:lnTo>
+                  <a:cubicBezTo>
+                    <a:pt x="9699" y="3387565"/>
+                    <a:pt x="10447" y="3405952"/>
+                    <a:pt x="11359" y="3425479"/>
+                  </a:cubicBezTo>
+                  <a:lnTo>
+                    <a:pt x="12840" y="3453616"/>
+                  </a:lnTo>
+                  <a:lnTo>
+                    <a:pt x="10088" y="3453505"/>
+                  </a:lnTo>
+                  <a:cubicBezTo>
+                    <a:pt x="-1786" y="3446192"/>
+                    <a:pt x="-2668" y="3413238"/>
+                    <a:pt x="4780" y="3369666"/>
+                  </a:cubicBezTo>
+                  <a:close/>
+                  <a:moveTo>
+                    <a:pt x="8372" y="3312218"/>
+                  </a:moveTo>
+                  <a:cubicBezTo>
+                    <a:pt x="8874" y="3309151"/>
+                    <a:pt x="9584" y="3310642"/>
+                    <a:pt x="10474" y="3315559"/>
+                  </a:cubicBezTo>
+                  <a:lnTo>
+                    <a:pt x="13062" y="3335036"/>
+                  </a:lnTo>
+                  <a:lnTo>
+                    <a:pt x="8670" y="3353401"/>
+                  </a:lnTo>
+                  <a:lnTo>
+                    <a:pt x="8092" y="3331389"/>
+                  </a:lnTo>
+                  <a:cubicBezTo>
+                    <a:pt x="7953" y="3321118"/>
+                    <a:pt x="8037" y="3314336"/>
+                    <a:pt x="8372" y="3312218"/>
+                  </a:cubicBezTo>
+                  <a:close/>
+                  <a:moveTo>
+                    <a:pt x="7241326" y="1569777"/>
+                  </a:moveTo>
+                  <a:cubicBezTo>
+                    <a:pt x="7223035" y="1582267"/>
+                    <a:pt x="7204746" y="1594758"/>
+                    <a:pt x="7186456" y="1607248"/>
+                  </a:cubicBezTo>
+                  <a:cubicBezTo>
+                    <a:pt x="7196717" y="1604126"/>
+                    <a:pt x="7207869" y="1601003"/>
+                    <a:pt x="7218575" y="1597880"/>
+                  </a:cubicBezTo>
+                  <a:cubicBezTo>
+                    <a:pt x="7227497" y="1590296"/>
+                    <a:pt x="7236865" y="1583160"/>
+                    <a:pt x="7245787" y="1575129"/>
+                  </a:cubicBezTo>
+                  <a:cubicBezTo>
+                    <a:pt x="7244449" y="1573345"/>
+                    <a:pt x="7242665" y="1571561"/>
+                    <a:pt x="7241326" y="1569777"/>
+                  </a:cubicBezTo>
+                  <a:close/>
+                  <a:moveTo>
+                    <a:pt x="6913001" y="943907"/>
+                  </a:moveTo>
+                  <a:cubicBezTo>
+                    <a:pt x="6803262" y="1018851"/>
+                    <a:pt x="6693523" y="1094241"/>
+                    <a:pt x="6583784" y="1169185"/>
+                  </a:cubicBezTo>
+                  <a:cubicBezTo>
+                    <a:pt x="6585569" y="1170969"/>
+                    <a:pt x="6586907" y="1172754"/>
+                    <a:pt x="6588692" y="1174538"/>
+                  </a:cubicBezTo>
+                  <a:cubicBezTo>
+                    <a:pt x="6709136" y="1111193"/>
+                    <a:pt x="6822890" y="1040710"/>
+                    <a:pt x="6913001" y="943907"/>
+                  </a:cubicBezTo>
+                  <a:close/>
+                  <a:moveTo>
+                    <a:pt x="7619780" y="253"/>
+                  </a:moveTo>
+                  <a:cubicBezTo>
+                    <a:pt x="7623962" y="-472"/>
+                    <a:pt x="7628088" y="197"/>
+                    <a:pt x="7631657" y="4435"/>
+                  </a:cubicBezTo>
+                  <a:cubicBezTo>
+                    <a:pt x="7637902" y="11572"/>
+                    <a:pt x="7632550" y="20049"/>
+                    <a:pt x="7628088" y="26294"/>
+                  </a:cubicBezTo>
+                  <a:cubicBezTo>
+                    <a:pt x="7620059" y="37446"/>
+                    <a:pt x="7612921" y="48152"/>
+                    <a:pt x="7609799" y="61535"/>
+                  </a:cubicBezTo>
+                  <a:cubicBezTo>
+                    <a:pt x="7607569" y="70457"/>
+                    <a:pt x="7605337" y="80271"/>
+                    <a:pt x="7611583" y="86962"/>
+                  </a:cubicBezTo>
+                  <a:cubicBezTo>
+                    <a:pt x="7637456" y="115512"/>
+                    <a:pt x="7618720" y="128895"/>
+                    <a:pt x="7596416" y="144062"/>
+                  </a:cubicBezTo>
+                  <a:cubicBezTo>
+                    <a:pt x="7565636" y="164583"/>
+                    <a:pt x="7553591" y="194916"/>
+                    <a:pt x="7560728" y="231050"/>
+                  </a:cubicBezTo>
+                  <a:cubicBezTo>
+                    <a:pt x="7563405" y="245772"/>
+                    <a:pt x="7561621" y="254693"/>
+                    <a:pt x="7543330" y="254247"/>
+                  </a:cubicBezTo>
+                  <a:cubicBezTo>
+                    <a:pt x="7536194" y="254247"/>
+                    <a:pt x="7534409" y="259155"/>
+                    <a:pt x="7531732" y="264507"/>
+                  </a:cubicBezTo>
+                  <a:cubicBezTo>
+                    <a:pt x="7474633" y="390752"/>
+                    <a:pt x="7392105" y="501383"/>
+                    <a:pt x="7295303" y="603092"/>
+                  </a:cubicBezTo>
+                  <a:cubicBezTo>
+                    <a:pt x="7216791" y="685620"/>
+                    <a:pt x="7130248" y="760117"/>
+                    <a:pt x="7040584" y="832385"/>
+                  </a:cubicBezTo>
+                  <a:cubicBezTo>
+                    <a:pt x="7037908" y="834615"/>
+                    <a:pt x="7035231" y="837291"/>
+                    <a:pt x="7033892" y="841752"/>
+                  </a:cubicBezTo>
+                  <a:cubicBezTo>
+                    <a:pt x="7076271" y="832831"/>
+                    <a:pt x="7112851" y="814540"/>
+                    <a:pt x="7148093" y="794021"/>
+                  </a:cubicBezTo>
+                  <a:cubicBezTo>
+                    <a:pt x="7241772" y="739597"/>
+                    <a:pt x="7320730" y="669114"/>
+                    <a:pt x="7400581" y="599969"/>
+                  </a:cubicBezTo>
+                  <a:cubicBezTo>
+                    <a:pt x="7449206" y="557591"/>
+                    <a:pt x="7499167" y="516550"/>
+                    <a:pt x="7552699" y="479079"/>
+                  </a:cubicBezTo>
+                  <a:cubicBezTo>
+                    <a:pt x="7561621" y="472833"/>
+                    <a:pt x="7567866" y="464803"/>
+                    <a:pt x="7574111" y="456774"/>
+                  </a:cubicBezTo>
+                  <a:cubicBezTo>
+                    <a:pt x="7577680" y="452313"/>
+                    <a:pt x="7582140" y="448298"/>
+                    <a:pt x="7589278" y="450083"/>
+                  </a:cubicBezTo>
+                  <a:cubicBezTo>
+                    <a:pt x="7598201" y="452313"/>
+                    <a:pt x="7599092" y="459004"/>
+                    <a:pt x="7599985" y="465696"/>
+                  </a:cubicBezTo>
+                  <a:cubicBezTo>
+                    <a:pt x="7602661" y="487108"/>
+                    <a:pt x="7596862" y="506290"/>
+                    <a:pt x="7585709" y="524580"/>
+                  </a:cubicBezTo>
+                  <a:cubicBezTo>
+                    <a:pt x="7556713" y="571419"/>
+                    <a:pt x="7513889" y="607553"/>
+                    <a:pt x="7469725" y="641903"/>
+                  </a:cubicBezTo>
+                  <a:cubicBezTo>
+                    <a:pt x="7412626" y="686066"/>
+                    <a:pt x="7357310" y="732014"/>
+                    <a:pt x="7306902" y="782422"/>
+                  </a:cubicBezTo>
+                  <a:cubicBezTo>
+                    <a:pt x="7303333" y="785991"/>
+                    <a:pt x="7296642" y="788221"/>
+                    <a:pt x="7298872" y="798481"/>
+                  </a:cubicBezTo>
+                  <a:cubicBezTo>
+                    <a:pt x="7330544" y="774838"/>
+                    <a:pt x="7360433" y="751642"/>
+                    <a:pt x="7390767" y="729336"/>
+                  </a:cubicBezTo>
+                  <a:cubicBezTo>
+                    <a:pt x="7420655" y="707032"/>
+                    <a:pt x="7450990" y="684727"/>
+                    <a:pt x="7480878" y="662869"/>
+                  </a:cubicBezTo>
+                  <a:cubicBezTo>
+                    <a:pt x="7488016" y="657516"/>
+                    <a:pt x="7495599" y="649932"/>
+                    <a:pt x="7505859" y="656624"/>
+                  </a:cubicBezTo>
+                  <a:cubicBezTo>
+                    <a:pt x="7516565" y="663315"/>
+                    <a:pt x="7515227" y="674467"/>
+                    <a:pt x="7512550" y="683389"/>
+                  </a:cubicBezTo>
+                  <a:cubicBezTo>
+                    <a:pt x="7504075" y="709708"/>
+                    <a:pt x="7489353" y="732905"/>
+                    <a:pt x="7469725" y="753426"/>
+                  </a:cubicBezTo>
+                  <a:cubicBezTo>
+                    <a:pt x="7402812" y="821232"/>
+                    <a:pt x="7325638" y="879670"/>
+                    <a:pt x="7253816" y="943015"/>
+                  </a:cubicBezTo>
+                  <a:cubicBezTo>
+                    <a:pt x="7215006" y="977365"/>
+                    <a:pt x="7179319" y="1013945"/>
+                    <a:pt x="7145415" y="1051862"/>
+                  </a:cubicBezTo>
+                  <a:cubicBezTo>
+                    <a:pt x="7137832" y="1060338"/>
+                    <a:pt x="7138279" y="1068368"/>
+                    <a:pt x="7140509" y="1078182"/>
+                  </a:cubicBezTo>
+                  <a:cubicBezTo>
+                    <a:pt x="7149430" y="1117885"/>
+                    <a:pt x="7135602" y="1131267"/>
+                    <a:pt x="7090992" y="1123684"/>
+                  </a:cubicBezTo>
+                  <a:cubicBezTo>
+                    <a:pt x="7077164" y="1121452"/>
+                    <a:pt x="7067796" y="1123684"/>
+                    <a:pt x="7059320" y="1133051"/>
+                  </a:cubicBezTo>
+                  <a:cubicBezTo>
+                    <a:pt x="6956718" y="1249035"/>
+                    <a:pt x="6835381" y="1346730"/>
+                    <a:pt x="6702891" y="1433718"/>
+                  </a:cubicBezTo>
+                  <a:cubicBezTo>
+                    <a:pt x="6648914" y="1468959"/>
+                    <a:pt x="6593152" y="1502417"/>
+                    <a:pt x="6536499" y="1533643"/>
+                  </a:cubicBezTo>
+                  <a:cubicBezTo>
+                    <a:pt x="6536499" y="1535873"/>
+                    <a:pt x="6536499" y="1538551"/>
+                    <a:pt x="6536499" y="1540781"/>
+                  </a:cubicBezTo>
+                  <a:cubicBezTo>
+                    <a:pt x="6536945" y="1543903"/>
+                    <a:pt x="6537391" y="1545687"/>
+                    <a:pt x="6537836" y="1548365"/>
+                  </a:cubicBezTo>
+                  <a:cubicBezTo>
+                    <a:pt x="6617688" y="1500186"/>
+                    <a:pt x="6696646" y="1450670"/>
+                    <a:pt x="6773821" y="1398477"/>
+                  </a:cubicBezTo>
+                  <a:cubicBezTo>
+                    <a:pt x="6983038" y="1257066"/>
+                    <a:pt x="7182888" y="1105393"/>
+                    <a:pt x="7385860" y="957290"/>
+                  </a:cubicBezTo>
+                  <a:cubicBezTo>
+                    <a:pt x="7454112" y="907327"/>
+                    <a:pt x="7508089" y="843536"/>
+                    <a:pt x="7569650" y="787329"/>
+                  </a:cubicBezTo>
+                  <a:cubicBezTo>
+                    <a:pt x="7610691" y="749857"/>
+                    <a:pt x="7649948" y="710601"/>
+                    <a:pt x="7697679" y="679821"/>
+                  </a:cubicBezTo>
+                  <a:cubicBezTo>
+                    <a:pt x="7717307" y="667330"/>
+                    <a:pt x="7737827" y="656177"/>
+                    <a:pt x="7764147" y="659300"/>
+                  </a:cubicBezTo>
+                  <a:cubicBezTo>
+                    <a:pt x="7774407" y="660639"/>
+                    <a:pt x="7786005" y="663315"/>
+                    <a:pt x="7789574" y="674913"/>
+                  </a:cubicBezTo>
+                  <a:cubicBezTo>
+                    <a:pt x="7792698" y="686512"/>
+                    <a:pt x="7783329" y="691865"/>
+                    <a:pt x="7774853" y="696771"/>
+                  </a:cubicBezTo>
+                  <a:cubicBezTo>
+                    <a:pt x="7772623" y="698110"/>
+                    <a:pt x="7770392" y="699895"/>
+                    <a:pt x="7768162" y="699895"/>
+                  </a:cubicBezTo>
+                  <a:cubicBezTo>
+                    <a:pt x="7725783" y="702571"/>
+                    <a:pt x="7715969" y="736474"/>
+                    <a:pt x="7695894" y="761010"/>
+                  </a:cubicBezTo>
+                  <a:cubicBezTo>
+                    <a:pt x="7689649" y="768593"/>
+                    <a:pt x="7689203" y="776177"/>
+                    <a:pt x="7695894" y="785098"/>
+                  </a:cubicBezTo>
+                  <a:cubicBezTo>
+                    <a:pt x="7707940" y="801157"/>
+                    <a:pt x="7699463" y="808295"/>
+                    <a:pt x="7683404" y="812756"/>
+                  </a:cubicBezTo>
+                  <a:cubicBezTo>
+                    <a:pt x="7667345" y="817217"/>
+                    <a:pt x="7649948" y="818555"/>
+                    <a:pt x="7632550" y="828816"/>
+                  </a:cubicBezTo>
+                  <a:cubicBezTo>
+                    <a:pt x="7660207" y="837291"/>
+                    <a:pt x="7679389" y="828370"/>
+                    <a:pt x="7697233" y="817217"/>
+                  </a:cubicBezTo>
+                  <a:cubicBezTo>
+                    <a:pt x="7737382" y="792682"/>
+                    <a:pt x="7763254" y="756548"/>
+                    <a:pt x="7787790" y="719522"/>
+                  </a:cubicBezTo>
+                  <a:cubicBezTo>
+                    <a:pt x="7792698" y="712385"/>
+                    <a:pt x="7796712" y="704355"/>
+                    <a:pt x="7803403" y="698556"/>
+                  </a:cubicBezTo>
+                  <a:cubicBezTo>
+                    <a:pt x="7815894" y="686958"/>
+                    <a:pt x="7829277" y="685620"/>
+                    <a:pt x="7844443" y="699895"/>
+                  </a:cubicBezTo>
+                  <a:cubicBezTo>
+                    <a:pt x="7864518" y="718631"/>
+                    <a:pt x="7871655" y="717292"/>
+                    <a:pt x="7878347" y="693204"/>
+                  </a:cubicBezTo>
+                  <a:cubicBezTo>
+                    <a:pt x="7887269" y="660639"/>
+                    <a:pt x="7907343" y="637888"/>
+                    <a:pt x="7941692" y="625844"/>
+                  </a:cubicBezTo>
+                  <a:cubicBezTo>
+                    <a:pt x="7948829" y="623166"/>
+                    <a:pt x="7956413" y="619597"/>
+                    <a:pt x="7963996" y="625397"/>
+                  </a:cubicBezTo>
+                  <a:cubicBezTo>
+                    <a:pt x="7972026" y="632089"/>
+                    <a:pt x="7966674" y="638779"/>
+                    <a:pt x="7963551" y="645026"/>
+                  </a:cubicBezTo>
+                  <a:cubicBezTo>
+                    <a:pt x="7959090" y="654840"/>
+                    <a:pt x="7953737" y="664653"/>
+                    <a:pt x="7949722" y="674913"/>
+                  </a:cubicBezTo>
+                  <a:cubicBezTo>
+                    <a:pt x="7942584" y="691419"/>
+                    <a:pt x="7941245" y="708817"/>
+                    <a:pt x="7954628" y="724876"/>
+                  </a:cubicBezTo>
+                  <a:cubicBezTo>
+                    <a:pt x="7964443" y="736474"/>
+                    <a:pt x="7963551" y="744058"/>
+                    <a:pt x="7950614" y="752087"/>
+                  </a:cubicBezTo>
+                  <a:cubicBezTo>
+                    <a:pt x="7909127" y="777069"/>
+                    <a:pt x="7882808" y="809634"/>
+                    <a:pt x="7897083" y="860488"/>
+                  </a:cubicBezTo>
+                  <a:cubicBezTo>
+                    <a:pt x="7899313" y="867626"/>
+                    <a:pt x="7896636" y="874764"/>
+                    <a:pt x="7888161" y="874317"/>
+                  </a:cubicBezTo>
+                  <a:cubicBezTo>
+                    <a:pt x="7869425" y="872979"/>
+                    <a:pt x="7866303" y="884578"/>
+                    <a:pt x="7860949" y="896622"/>
+                  </a:cubicBezTo>
+                  <a:cubicBezTo>
+                    <a:pt x="7808757" y="1012160"/>
+                    <a:pt x="7733367" y="1112977"/>
+                    <a:pt x="7646379" y="1207549"/>
+                  </a:cubicBezTo>
+                  <a:cubicBezTo>
+                    <a:pt x="7560282" y="1301229"/>
+                    <a:pt x="7463480" y="1385094"/>
+                    <a:pt x="7360433" y="1465391"/>
+                  </a:cubicBezTo>
+                  <a:cubicBezTo>
+                    <a:pt x="7389429" y="1462714"/>
+                    <a:pt x="7426901" y="1446209"/>
+                    <a:pt x="7463034" y="1427027"/>
+                  </a:cubicBezTo>
+                  <a:cubicBezTo>
+                    <a:pt x="7558498" y="1375726"/>
+                    <a:pt x="7637011" y="1306135"/>
+                    <a:pt x="7716861" y="1237883"/>
+                  </a:cubicBezTo>
+                  <a:cubicBezTo>
+                    <a:pt x="7772623" y="1190151"/>
+                    <a:pt x="7827046" y="1141081"/>
+                    <a:pt x="7889500" y="1100040"/>
+                  </a:cubicBezTo>
+                  <a:cubicBezTo>
+                    <a:pt x="7896636" y="1095579"/>
+                    <a:pt x="7901544" y="1089780"/>
+                    <a:pt x="7905559" y="1082642"/>
+                  </a:cubicBezTo>
+                  <a:cubicBezTo>
+                    <a:pt x="7909127" y="1076397"/>
+                    <a:pt x="7914481" y="1070598"/>
+                    <a:pt x="7923848" y="1073274"/>
+                  </a:cubicBezTo>
+                  <a:cubicBezTo>
+                    <a:pt x="7933216" y="1076397"/>
+                    <a:pt x="7934109" y="1084427"/>
+                    <a:pt x="7934109" y="1091565"/>
+                  </a:cubicBezTo>
+                  <a:cubicBezTo>
+                    <a:pt x="7932770" y="1118330"/>
+                    <a:pt x="7925186" y="1142419"/>
+                    <a:pt x="7908682" y="1163831"/>
+                  </a:cubicBezTo>
+                  <a:cubicBezTo>
+                    <a:pt x="7876563" y="1206657"/>
+                    <a:pt x="7833738" y="1240114"/>
+                    <a:pt x="7790913" y="1273570"/>
+                  </a:cubicBezTo>
+                  <a:cubicBezTo>
+                    <a:pt x="7731582" y="1319518"/>
+                    <a:pt x="7676712" y="1369481"/>
+                    <a:pt x="7627197" y="1425243"/>
+                  </a:cubicBezTo>
+                  <a:cubicBezTo>
+                    <a:pt x="7662883" y="1398031"/>
+                    <a:pt x="7698572" y="1370372"/>
+                    <a:pt x="7734705" y="1343161"/>
+                  </a:cubicBezTo>
+                  <a:cubicBezTo>
+                    <a:pt x="7761917" y="1322641"/>
+                    <a:pt x="7790020" y="1303012"/>
+                    <a:pt x="7817678" y="1282938"/>
+                  </a:cubicBezTo>
+                  <a:cubicBezTo>
+                    <a:pt x="7824370" y="1278032"/>
+                    <a:pt x="7831507" y="1272679"/>
+                    <a:pt x="7840874" y="1279370"/>
+                  </a:cubicBezTo>
+                  <a:cubicBezTo>
+                    <a:pt x="7849351" y="1285169"/>
+                    <a:pt x="7848012" y="1293645"/>
+                    <a:pt x="7846228" y="1301675"/>
+                  </a:cubicBezTo>
+                  <a:cubicBezTo>
+                    <a:pt x="7839537" y="1333347"/>
+                    <a:pt x="7820801" y="1358774"/>
+                    <a:pt x="7797604" y="1381525"/>
+                  </a:cubicBezTo>
+                  <a:cubicBezTo>
+                    <a:pt x="7769501" y="1408737"/>
+                    <a:pt x="7740058" y="1434611"/>
+                    <a:pt x="7709724" y="1460484"/>
+                  </a:cubicBezTo>
+                  <a:cubicBezTo>
+                    <a:pt x="7742288" y="1453346"/>
+                    <a:pt x="7774853" y="1446209"/>
+                    <a:pt x="7807418" y="1440410"/>
+                  </a:cubicBezTo>
+                  <a:cubicBezTo>
+                    <a:pt x="7792698" y="1492156"/>
+                    <a:pt x="7758348" y="1502417"/>
+                    <a:pt x="7727568" y="1510446"/>
+                  </a:cubicBezTo>
+                  <a:cubicBezTo>
+                    <a:pt x="7686080" y="1520706"/>
+                    <a:pt x="7646379" y="1533643"/>
+                    <a:pt x="7607122" y="1548365"/>
+                  </a:cubicBezTo>
+                  <a:cubicBezTo>
+                    <a:pt x="7590617" y="1563085"/>
+                    <a:pt x="7574111" y="1577361"/>
+                    <a:pt x="7558052" y="1592527"/>
+                  </a:cubicBezTo>
+                  <a:cubicBezTo>
+                    <a:pt x="7541546" y="1608141"/>
+                    <a:pt x="7525933" y="1623754"/>
+                    <a:pt x="7510320" y="1640259"/>
+                  </a:cubicBezTo>
+                  <a:cubicBezTo>
+                    <a:pt x="7499167" y="1652303"/>
+                    <a:pt x="7485785" y="1662564"/>
+                    <a:pt x="7498721" y="1683084"/>
+                  </a:cubicBezTo>
+                  <a:cubicBezTo>
+                    <a:pt x="7504521" y="1692452"/>
+                    <a:pt x="7466603" y="1743307"/>
+                    <a:pt x="7454558" y="1746429"/>
+                  </a:cubicBezTo>
+                  <a:cubicBezTo>
+                    <a:pt x="7452773" y="1746875"/>
+                    <a:pt x="7450990" y="1747322"/>
+                    <a:pt x="7449652" y="1747322"/>
+                  </a:cubicBezTo>
+                  <a:cubicBezTo>
+                    <a:pt x="7423777" y="1745538"/>
+                    <a:pt x="7417978" y="1760705"/>
+                    <a:pt x="7417532" y="1779887"/>
+                  </a:cubicBezTo>
+                  <a:cubicBezTo>
+                    <a:pt x="7417087" y="1798622"/>
+                    <a:pt x="7421547" y="1821819"/>
+                    <a:pt x="7386306" y="1812451"/>
+                  </a:cubicBezTo>
+                  <a:cubicBezTo>
+                    <a:pt x="7382291" y="1811559"/>
+                    <a:pt x="7381399" y="1814235"/>
+                    <a:pt x="7379615" y="1817358"/>
+                  </a:cubicBezTo>
+                  <a:cubicBezTo>
+                    <a:pt x="7341251" y="1897208"/>
+                    <a:pt x="7276567" y="1958770"/>
+                    <a:pt x="7212776" y="2020331"/>
+                  </a:cubicBezTo>
+                  <a:cubicBezTo>
+                    <a:pt x="7209207" y="2023454"/>
+                    <a:pt x="7205638" y="2026576"/>
+                    <a:pt x="7202070" y="2029699"/>
+                  </a:cubicBezTo>
+                  <a:cubicBezTo>
+                    <a:pt x="7268983" y="2014086"/>
+                    <a:pt x="7489800" y="1994011"/>
+                    <a:pt x="7554483" y="2000703"/>
+                  </a:cubicBezTo>
+                  <a:cubicBezTo>
+                    <a:pt x="7612029" y="2006502"/>
+                    <a:pt x="7937231" y="1909254"/>
+                    <a:pt x="8004591" y="1851708"/>
+                  </a:cubicBezTo>
+                  <a:cubicBezTo>
+                    <a:pt x="8013959" y="1896763"/>
+                    <a:pt x="7993885" y="1914606"/>
+                    <a:pt x="7977825" y="1935127"/>
+                  </a:cubicBezTo>
+                  <a:cubicBezTo>
+                    <a:pt x="7955075" y="1964123"/>
+                    <a:pt x="7951506" y="1984644"/>
+                    <a:pt x="7994331" y="2007840"/>
+                  </a:cubicBezTo>
+                  <a:cubicBezTo>
+                    <a:pt x="8117007" y="2073862"/>
+                    <a:pt x="8115669" y="2076092"/>
+                    <a:pt x="8000576" y="2165757"/>
+                  </a:cubicBezTo>
+                  <a:cubicBezTo>
+                    <a:pt x="7995223" y="2169772"/>
+                    <a:pt x="7997900" y="2182708"/>
+                    <a:pt x="7996561" y="2191631"/>
+                  </a:cubicBezTo>
+                  <a:cubicBezTo>
+                    <a:pt x="8026450" y="2205014"/>
+                    <a:pt x="8061691" y="2170218"/>
+                    <a:pt x="8097378" y="2207690"/>
+                  </a:cubicBezTo>
+                  <a:cubicBezTo>
+                    <a:pt x="7943477" y="2372298"/>
+                    <a:pt x="7709277" y="2528878"/>
+                    <a:pt x="7496937" y="2652445"/>
+                  </a:cubicBezTo>
+                  <a:cubicBezTo>
+                    <a:pt x="7668683" y="2693040"/>
+                    <a:pt x="7771731" y="2550290"/>
+                    <a:pt x="7897975" y="2568579"/>
+                  </a:cubicBezTo>
+                  <a:cubicBezTo>
+                    <a:pt x="7960875" y="2613189"/>
+                    <a:pt x="7773515" y="2685456"/>
+                    <a:pt x="7952398" y="2706423"/>
+                  </a:cubicBezTo>
+                  <a:cubicBezTo>
+                    <a:pt x="7874778" y="2745678"/>
+                    <a:pt x="7817232" y="2784043"/>
+                    <a:pt x="7763701" y="2829098"/>
+                  </a:cubicBezTo>
+                  <a:cubicBezTo>
+                    <a:pt x="7668683" y="2909841"/>
+                    <a:pt x="7649948" y="2963373"/>
+                    <a:pt x="7693664" y="3071773"/>
+                  </a:cubicBezTo>
+                  <a:cubicBezTo>
+                    <a:pt x="7722660" y="3143148"/>
+                    <a:pt x="7764593" y="3208723"/>
+                    <a:pt x="7727568" y="3293927"/>
+                  </a:cubicBezTo>
+                  <a:cubicBezTo>
+                    <a:pt x="7702141" y="3352365"/>
+                    <a:pt x="7711954" y="3390729"/>
+                    <a:pt x="7808311" y="3364409"/>
+                  </a:cubicBezTo>
+                  <a:cubicBezTo>
+                    <a:pt x="7912249" y="3336306"/>
+                    <a:pt x="7951506" y="3388945"/>
+                    <a:pt x="7925186" y="3491100"/>
+                  </a:cubicBezTo>
+                  <a:cubicBezTo>
+                    <a:pt x="7908235" y="3556676"/>
+                    <a:pt x="7926079" y="3577197"/>
+                    <a:pt x="7997454" y="3569613"/>
+                  </a:cubicBezTo>
+                  <a:cubicBezTo>
+                    <a:pt x="8076413" y="3561136"/>
+                    <a:pt x="8151355" y="3518312"/>
+                    <a:pt x="8249050" y="3538832"/>
+                  </a:cubicBezTo>
+                  <a:cubicBezTo>
+                    <a:pt x="8170985" y="3658385"/>
+                    <a:pt x="8004145" y="3624482"/>
+                    <a:pt x="7913142" y="3738236"/>
+                  </a:cubicBezTo>
+                  <a:cubicBezTo>
+                    <a:pt x="8021543" y="3738682"/>
+                    <a:pt x="8104516" y="3738236"/>
+                    <a:pt x="8184813" y="3713254"/>
+                  </a:cubicBezTo>
+                  <a:cubicBezTo>
+                    <a:pt x="8218270" y="3702995"/>
+                    <a:pt x="8254850" y="3692735"/>
+                    <a:pt x="8273586" y="3727083"/>
+                  </a:cubicBezTo>
+                  <a:cubicBezTo>
+                    <a:pt x="8295890" y="3768570"/>
+                    <a:pt x="8250389" y="3784184"/>
+                    <a:pt x="8223177" y="3791767"/>
+                  </a:cubicBezTo>
+                  <a:cubicBezTo>
+                    <a:pt x="8146449" y="3812734"/>
+                    <a:pt x="8087564" y="3862249"/>
+                    <a:pt x="8023773" y="3901059"/>
+                  </a:cubicBezTo>
+                  <a:cubicBezTo>
+                    <a:pt x="7884146" y="3986264"/>
+                    <a:pt x="7730689" y="4057192"/>
+                    <a:pt x="7612475" y="4197266"/>
+                  </a:cubicBezTo>
+                  <a:cubicBezTo>
+                    <a:pt x="7761024" y="4161579"/>
+                    <a:pt x="7872102" y="4078159"/>
+                    <a:pt x="8010390" y="4061208"/>
+                  </a:cubicBezTo>
+                  <a:cubicBezTo>
+                    <a:pt x="7890391" y="4189236"/>
+                    <a:pt x="7736489" y="4272656"/>
+                    <a:pt x="7590617" y="4365889"/>
+                  </a:cubicBezTo>
+                  <a:cubicBezTo>
+                    <a:pt x="7549130" y="4392209"/>
+                    <a:pt x="7506751" y="4410052"/>
+                    <a:pt x="7497384" y="4467153"/>
+                  </a:cubicBezTo>
+                  <a:cubicBezTo>
+                    <a:pt x="7479093" y="4577783"/>
+                    <a:pt x="7425116" y="4669679"/>
+                    <a:pt x="7308686" y="4718303"/>
+                  </a:cubicBezTo>
+                  <a:cubicBezTo>
+                    <a:pt x="7307793" y="4718749"/>
+                    <a:pt x="7314039" y="4735255"/>
+                    <a:pt x="7318054" y="4746853"/>
+                  </a:cubicBezTo>
+                  <a:cubicBezTo>
+                    <a:pt x="7388982" y="4750422"/>
+                    <a:pt x="7444744" y="4684845"/>
+                    <a:pt x="7535747" y="4706259"/>
+                  </a:cubicBezTo>
+                  <a:cubicBezTo>
+                    <a:pt x="7449206" y="4795031"/>
+                    <a:pt x="7376492" y="4874882"/>
+                    <a:pt x="7253370" y="4917261"/>
+                  </a:cubicBezTo>
+                  <a:cubicBezTo>
+                    <a:pt x="7154784" y="4951164"/>
+                    <a:pt x="7033000" y="4970345"/>
+                    <a:pt x="6961625" y="5079638"/>
+                  </a:cubicBezTo>
+                  <a:cubicBezTo>
+                    <a:pt x="7044599" y="5101051"/>
+                    <a:pt x="7106605" y="5074285"/>
+                    <a:pt x="7168612" y="5055104"/>
+                  </a:cubicBezTo>
+                  <a:cubicBezTo>
+                    <a:pt x="7264077" y="5025661"/>
+                    <a:pt x="7357756" y="4992204"/>
+                    <a:pt x="7453220" y="4962316"/>
+                  </a:cubicBezTo>
+                  <a:cubicBezTo>
+                    <a:pt x="7489353" y="4951164"/>
+                    <a:pt x="7529056" y="4942688"/>
+                    <a:pt x="7552253" y="4997111"/>
+                  </a:cubicBezTo>
+                  <a:cubicBezTo>
+                    <a:pt x="7431361" y="5008709"/>
+                    <a:pt x="7358649" y="5081869"/>
+                    <a:pt x="7282812" y="5150568"/>
+                  </a:cubicBezTo>
+                  <a:cubicBezTo>
+                    <a:pt x="7239987" y="5189378"/>
+                    <a:pt x="7205192" y="5241125"/>
+                    <a:pt x="7128464" y="5221497"/>
+                  </a:cubicBezTo>
+                  <a:cubicBezTo>
+                    <a:pt x="7087869" y="5211236"/>
+                    <a:pt x="7061996" y="5240233"/>
+                    <a:pt x="7066457" y="5275920"/>
+                  </a:cubicBezTo>
+                  <a:cubicBezTo>
+                    <a:pt x="7081624" y="5401718"/>
+                    <a:pt x="6987498" y="5445881"/>
+                    <a:pt x="6889805" y="5469970"/>
+                  </a:cubicBezTo>
+                  <a:cubicBezTo>
+                    <a:pt x="6705122" y="5515918"/>
+                    <a:pt x="6551219" y="5623426"/>
+                    <a:pt x="6371444" y="5682310"/>
+                  </a:cubicBezTo>
+                  <a:cubicBezTo>
+                    <a:pt x="6196576" y="5739411"/>
+                    <a:pt x="4884170" y="6004390"/>
+                    <a:pt x="4551831" y="6030710"/>
+                  </a:cubicBezTo>
+                  <a:cubicBezTo>
+                    <a:pt x="2518092" y="6191749"/>
+                    <a:pt x="1055352" y="4921275"/>
+                    <a:pt x="1048661" y="4903878"/>
+                  </a:cubicBezTo>
+                  <a:cubicBezTo>
+                    <a:pt x="1017880" y="4822243"/>
+                    <a:pt x="941599" y="4787001"/>
+                    <a:pt x="872455" y="4743284"/>
+                  </a:cubicBezTo>
+                  <a:cubicBezTo>
+                    <a:pt x="812231" y="4704920"/>
+                    <a:pt x="747994" y="4664326"/>
+                    <a:pt x="723013" y="4598750"/>
+                  </a:cubicBezTo>
+                  <a:cubicBezTo>
+                    <a:pt x="690002" y="4511762"/>
+                    <a:pt x="783682" y="4583137"/>
+                    <a:pt x="801080" y="4549680"/>
+                  </a:cubicBezTo>
+                  <a:cubicBezTo>
+                    <a:pt x="765392" y="4504624"/>
+                    <a:pt x="710077" y="4463138"/>
+                    <a:pt x="695355" y="4411837"/>
+                  </a:cubicBezTo>
+                  <a:cubicBezTo>
+                    <a:pt x="642715" y="4226262"/>
+                    <a:pt x="529409" y="4091096"/>
+                    <a:pt x="359893" y="3986264"/>
+                  </a:cubicBezTo>
+                  <a:cubicBezTo>
+                    <a:pt x="311269" y="3955930"/>
+                    <a:pt x="279150" y="3901506"/>
+                    <a:pt x="212682" y="3892584"/>
+                  </a:cubicBezTo>
+                  <a:cubicBezTo>
+                    <a:pt x="65025" y="3873402"/>
+                    <a:pt x="111866" y="3723515"/>
+                    <a:pt x="33799" y="3657047"/>
+                  </a:cubicBezTo>
+                  <a:cubicBezTo>
+                    <a:pt x="26438" y="3650802"/>
+                    <a:pt x="19412" y="3568832"/>
+                    <a:pt x="14561" y="3486305"/>
+                  </a:cubicBezTo>
+                  <a:lnTo>
+                    <a:pt x="12840" y="3453616"/>
+                  </a:lnTo>
+                  <a:lnTo>
+                    <a:pt x="21095" y="3453948"/>
+                  </a:lnTo>
+                  <a:lnTo>
+                    <a:pt x="25905" y="3450639"/>
+                  </a:lnTo>
+                  <a:lnTo>
+                    <a:pt x="27770" y="3466411"/>
+                  </a:lnTo>
+                  <a:cubicBezTo>
+                    <a:pt x="33262" y="3508951"/>
+                    <a:pt x="39263" y="3541509"/>
+                    <a:pt x="44951" y="3533479"/>
+                  </a:cubicBezTo>
+                  <a:cubicBezTo>
+                    <a:pt x="60119" y="3511621"/>
+                    <a:pt x="83315" y="3492439"/>
+                    <a:pt x="72163" y="3463889"/>
+                  </a:cubicBezTo>
+                  <a:cubicBezTo>
+                    <a:pt x="67702" y="3451844"/>
+                    <a:pt x="70824" y="3410804"/>
+                    <a:pt x="36475" y="3443368"/>
+                  </a:cubicBezTo>
+                  <a:lnTo>
+                    <a:pt x="25905" y="3450639"/>
+                  </a:lnTo>
+                  <a:lnTo>
+                    <a:pt x="22479" y="3421677"/>
+                  </a:lnTo>
+                  <a:cubicBezTo>
+                    <a:pt x="19106" y="3391148"/>
+                    <a:pt x="16081" y="3360716"/>
+                    <a:pt x="13648" y="3339450"/>
+                  </a:cubicBezTo>
+                  <a:lnTo>
+                    <a:pt x="13062" y="3335036"/>
+                  </a:lnTo>
+                  <a:lnTo>
+                    <a:pt x="21866" y="3298221"/>
+                  </a:lnTo>
+                  <a:cubicBezTo>
+                    <a:pt x="52089" y="3197348"/>
+                    <a:pt x="110303" y="3084040"/>
+                    <a:pt x="175210" y="3078464"/>
+                  </a:cubicBezTo>
+                  <a:cubicBezTo>
+                    <a:pt x="127925" y="2954896"/>
+                    <a:pt x="127925" y="2954896"/>
+                    <a:pt x="282273" y="2937945"/>
+                  </a:cubicBezTo>
+                  <a:cubicBezTo>
+                    <a:pt x="222942" y="2859432"/>
+                    <a:pt x="222942" y="2839357"/>
+                    <a:pt x="294764" y="2812593"/>
+                  </a:cubicBezTo>
+                  <a:cubicBezTo>
+                    <a:pt x="363908" y="2786719"/>
+                    <a:pt x="440636" y="2778244"/>
+                    <a:pt x="504427" y="2738541"/>
+                  </a:cubicBezTo>
+                  <a:cubicBezTo>
+                    <a:pt x="445542" y="2638170"/>
+                    <a:pt x="429038" y="2522185"/>
+                    <a:pt x="307254" y="2473116"/>
+                  </a:cubicBezTo>
+                  <a:cubicBezTo>
+                    <a:pt x="288072" y="2465532"/>
+                    <a:pt x="275135" y="2435197"/>
+                    <a:pt x="287626" y="2418246"/>
+                  </a:cubicBezTo>
+                  <a:cubicBezTo>
+                    <a:pt x="331790" y="2355347"/>
+                    <a:pt x="268444" y="2234901"/>
+                    <a:pt x="405841" y="2221965"/>
+                  </a:cubicBezTo>
+                  <a:cubicBezTo>
+                    <a:pt x="422793" y="2220181"/>
+                    <a:pt x="438406" y="2207690"/>
+                    <a:pt x="425023" y="2190292"/>
+                  </a:cubicBezTo>
+                  <a:cubicBezTo>
+                    <a:pt x="379075" y="2130962"/>
+                    <a:pt x="434837" y="2134976"/>
+                    <a:pt x="468739" y="2127394"/>
+                  </a:cubicBezTo>
+                  <a:cubicBezTo>
+                    <a:pt x="509781" y="2118471"/>
+                    <a:pt x="556174" y="2144344"/>
+                    <a:pt x="594091" y="2112226"/>
+                  </a:cubicBezTo>
+                  <a:cubicBezTo>
+                    <a:pt x="585170" y="2078323"/>
+                    <a:pt x="552160" y="2078769"/>
+                    <a:pt x="528963" y="2068063"/>
+                  </a:cubicBezTo>
+                  <a:cubicBezTo>
+                    <a:pt x="461157" y="2036390"/>
+                    <a:pt x="405841" y="1998918"/>
+                    <a:pt x="402718" y="1917729"/>
+                  </a:cubicBezTo>
+                  <a:cubicBezTo>
+                    <a:pt x="400042" y="1852153"/>
+                    <a:pt x="392904" y="1794162"/>
+                    <a:pt x="486584" y="1774087"/>
+                  </a:cubicBezTo>
+                  <a:cubicBezTo>
+                    <a:pt x="501304" y="1770965"/>
+                    <a:pt x="508888" y="1762489"/>
+                    <a:pt x="511565" y="1751337"/>
+                  </a:cubicBezTo>
+                  <a:cubicBezTo>
+                    <a:pt x="500858" y="1740630"/>
+                    <a:pt x="490599" y="1729477"/>
+                    <a:pt x="478109" y="1721448"/>
+                  </a:cubicBezTo>
+                  <a:cubicBezTo>
+                    <a:pt x="436175" y="1695129"/>
+                    <a:pt x="421900" y="1656318"/>
+                    <a:pt x="409410" y="1615724"/>
+                  </a:cubicBezTo>
+                  <a:cubicBezTo>
+                    <a:pt x="401380" y="1589851"/>
+                    <a:pt x="392012" y="1564424"/>
+                    <a:pt x="373722" y="1542118"/>
+                  </a:cubicBezTo>
+                  <a:cubicBezTo>
+                    <a:pt x="362569" y="1528290"/>
+                    <a:pt x="348740" y="1518030"/>
+                    <a:pt x="331343" y="1512231"/>
+                  </a:cubicBezTo>
+                  <a:cubicBezTo>
+                    <a:pt x="316177" y="1506877"/>
+                    <a:pt x="311715" y="1499739"/>
+                    <a:pt x="321976" y="1486804"/>
+                  </a:cubicBezTo>
+                  <a:cubicBezTo>
+                    <a:pt x="350972" y="1449777"/>
+                    <a:pt x="362569" y="1409182"/>
+                    <a:pt x="343388" y="1361897"/>
+                  </a:cubicBezTo>
+                  <a:cubicBezTo>
+                    <a:pt x="337588" y="1347623"/>
+                    <a:pt x="341602" y="1335131"/>
+                    <a:pt x="355432" y="1329778"/>
+                  </a:cubicBezTo>
+                  <a:cubicBezTo>
+                    <a:pt x="412979" y="1307028"/>
+                    <a:pt x="427253" y="1254388"/>
+                    <a:pt x="451789" y="1209779"/>
+                  </a:cubicBezTo>
+                  <a:cubicBezTo>
+                    <a:pt x="486584" y="1146434"/>
+                    <a:pt x="518256" y="1081751"/>
+                    <a:pt x="542344" y="1013052"/>
+                  </a:cubicBezTo>
+                  <a:cubicBezTo>
+                    <a:pt x="556620" y="972012"/>
+                    <a:pt x="570449" y="931417"/>
+                    <a:pt x="560635" y="885915"/>
+                  </a:cubicBezTo>
+                  <a:cubicBezTo>
+                    <a:pt x="558405" y="874764"/>
+                    <a:pt x="562419" y="865395"/>
+                    <a:pt x="568219" y="856919"/>
+                  </a:cubicBezTo>
+                  <a:cubicBezTo>
+                    <a:pt x="592754" y="819893"/>
+                    <a:pt x="589631" y="780638"/>
+                    <a:pt x="570895" y="740043"/>
+                  </a:cubicBezTo>
+                  <a:cubicBezTo>
+                    <a:pt x="559296" y="715508"/>
+                    <a:pt x="560635" y="712385"/>
+                    <a:pt x="590077" y="713277"/>
+                  </a:cubicBezTo>
+                  <a:cubicBezTo>
+                    <a:pt x="649853" y="714616"/>
+                    <a:pt x="709184" y="716846"/>
+                    <a:pt x="768069" y="709263"/>
+                  </a:cubicBezTo>
+                  <a:cubicBezTo>
+                    <a:pt x="834090" y="700786"/>
+                    <a:pt x="855503" y="681158"/>
+                    <a:pt x="805540" y="624505"/>
+                  </a:cubicBezTo>
+                  <a:cubicBezTo>
+                    <a:pt x="794833" y="612461"/>
+                    <a:pt x="785466" y="599078"/>
+                    <a:pt x="780559" y="583910"/>
+                  </a:cubicBezTo>
+                  <a:cubicBezTo>
+                    <a:pt x="776990" y="571866"/>
+                    <a:pt x="780113" y="563390"/>
+                    <a:pt x="790819" y="557591"/>
+                  </a:cubicBezTo>
+                  <a:cubicBezTo>
+                    <a:pt x="803310" y="550454"/>
+                    <a:pt x="810001" y="560268"/>
+                    <a:pt x="817139" y="567404"/>
+                  </a:cubicBezTo>
+                  <a:cubicBezTo>
+                    <a:pt x="855949" y="605769"/>
+                    <a:pt x="904572" y="632089"/>
+                    <a:pt x="950966" y="661085"/>
+                  </a:cubicBezTo>
+                  <a:cubicBezTo>
+                    <a:pt x="1017435" y="703018"/>
+                    <a:pt x="1087471" y="740043"/>
+                    <a:pt x="1146802" y="790897"/>
+                  </a:cubicBezTo>
+                  <a:cubicBezTo>
+                    <a:pt x="1161968" y="803835"/>
+                    <a:pt x="1186503" y="794021"/>
+                    <a:pt x="1188288" y="772161"/>
+                  </a:cubicBezTo>
+                  <a:cubicBezTo>
+                    <a:pt x="1190072" y="750303"/>
+                    <a:pt x="1202116" y="750303"/>
+                    <a:pt x="1219960" y="755656"/>
+                  </a:cubicBezTo>
+                  <a:cubicBezTo>
+                    <a:pt x="1241373" y="761901"/>
+                    <a:pt x="1262786" y="768146"/>
+                    <a:pt x="1283752" y="775284"/>
+                  </a:cubicBezTo>
+                  <a:cubicBezTo>
+                    <a:pt x="1305611" y="782868"/>
+                    <a:pt x="1315424" y="798927"/>
+                    <a:pt x="1317655" y="819002"/>
+                  </a:cubicBezTo>
+                  <a:cubicBezTo>
+                    <a:pt x="1318101" y="822794"/>
+                    <a:pt x="1318213" y="827031"/>
+                    <a:pt x="1317209" y="830488"/>
+                  </a:cubicBezTo>
+                  <a:lnTo>
+                    <a:pt x="1312784" y="834706"/>
+                  </a:lnTo>
+                  <a:lnTo>
+                    <a:pt x="1307604" y="836392"/>
+                  </a:lnTo>
+                  <a:cubicBezTo>
+                    <a:pt x="1302209" y="838239"/>
+                    <a:pt x="1301818" y="838741"/>
+                    <a:pt x="1310071" y="837291"/>
+                  </a:cubicBezTo>
+                  <a:lnTo>
+                    <a:pt x="1312784" y="834706"/>
+                  </a:lnTo>
+                  <a:lnTo>
+                    <a:pt x="1335164" y="827421"/>
+                  </a:lnTo>
+                  <a:cubicBezTo>
+                    <a:pt x="1358695" y="819559"/>
+                    <a:pt x="1387691" y="808741"/>
+                    <a:pt x="1393044" y="799820"/>
+                  </a:cubicBezTo>
+                  <a:cubicBezTo>
+                    <a:pt x="1393490" y="798927"/>
+                    <a:pt x="1657132" y="863165"/>
+                    <a:pt x="1737429" y="903760"/>
+                  </a:cubicBezTo>
+                  <a:cubicBezTo>
+                    <a:pt x="1787390" y="929187"/>
+                    <a:pt x="2773257" y="1331562"/>
+                    <a:pt x="4138303" y="1231638"/>
+                  </a:cubicBezTo>
+                  <a:cubicBezTo>
+                    <a:pt x="4186481" y="1228070"/>
+                    <a:pt x="4231982" y="1225838"/>
+                    <a:pt x="4278375" y="1224055"/>
+                  </a:cubicBezTo>
+                  <a:cubicBezTo>
+                    <a:pt x="4688781" y="1205764"/>
+                    <a:pt x="5091603" y="1196842"/>
+                    <a:pt x="5261564" y="1174984"/>
+                  </a:cubicBezTo>
+                  <a:cubicBezTo>
+                    <a:pt x="5394500" y="1157586"/>
+                    <a:pt x="6074346" y="1010376"/>
+                    <a:pt x="6273750" y="885915"/>
+                  </a:cubicBezTo>
+                  <a:cubicBezTo>
+                    <a:pt x="6477614" y="758332"/>
+                    <a:pt x="6669881" y="617367"/>
+                    <a:pt x="6861254" y="475956"/>
+                  </a:cubicBezTo>
+                  <a:cubicBezTo>
+                    <a:pt x="6944228" y="414841"/>
+                    <a:pt x="7032555" y="359079"/>
+                    <a:pt x="7107498" y="289043"/>
+                  </a:cubicBezTo>
+                  <a:cubicBezTo>
+                    <a:pt x="7182441" y="218560"/>
+                    <a:pt x="7253816" y="145401"/>
+                    <a:pt x="7335005" y="80271"/>
+                  </a:cubicBezTo>
+                  <a:cubicBezTo>
+                    <a:pt x="7358202" y="61535"/>
+                    <a:pt x="7381399" y="41461"/>
+                    <a:pt x="7415302" y="38338"/>
+                  </a:cubicBezTo>
+                  <a:cubicBezTo>
+                    <a:pt x="7422886" y="37446"/>
+                    <a:pt x="7430915" y="37892"/>
+                    <a:pt x="7438499" y="38784"/>
+                  </a:cubicBezTo>
+                  <a:cubicBezTo>
+                    <a:pt x="7446974" y="39677"/>
+                    <a:pt x="7453666" y="44137"/>
+                    <a:pt x="7456789" y="51721"/>
+                  </a:cubicBezTo>
+                  <a:cubicBezTo>
+                    <a:pt x="7459911" y="60197"/>
+                    <a:pt x="7454558" y="65104"/>
+                    <a:pt x="7448313" y="69564"/>
+                  </a:cubicBezTo>
+                  <a:cubicBezTo>
+                    <a:pt x="7443852" y="72687"/>
+                    <a:pt x="7439392" y="77595"/>
+                    <a:pt x="7433593" y="78487"/>
+                  </a:cubicBezTo>
+                  <a:cubicBezTo>
+                    <a:pt x="7396566" y="83840"/>
+                    <a:pt x="7382737" y="111052"/>
+                    <a:pt x="7365340" y="135140"/>
+                  </a:cubicBezTo>
+                  <a:cubicBezTo>
+                    <a:pt x="7357756" y="145401"/>
+                    <a:pt x="7349726" y="153430"/>
+                    <a:pt x="7363555" y="168151"/>
+                  </a:cubicBezTo>
+                  <a:cubicBezTo>
+                    <a:pt x="7375599" y="181088"/>
+                    <a:pt x="7363109" y="187780"/>
+                    <a:pt x="7350619" y="191349"/>
+                  </a:cubicBezTo>
+                  <a:cubicBezTo>
+                    <a:pt x="7333222" y="196255"/>
+                    <a:pt x="7312701" y="195364"/>
+                    <a:pt x="7293073" y="211422"/>
+                  </a:cubicBezTo>
+                  <a:cubicBezTo>
+                    <a:pt x="7366678" y="212761"/>
+                    <a:pt x="7397905" y="170382"/>
+                    <a:pt x="7431361" y="131125"/>
+                  </a:cubicBezTo>
+                  <a:cubicBezTo>
+                    <a:pt x="7443852" y="116851"/>
+                    <a:pt x="7452328" y="99899"/>
+                    <a:pt x="7463034" y="83840"/>
+                  </a:cubicBezTo>
+                  <a:cubicBezTo>
+                    <a:pt x="7476417" y="64212"/>
+                    <a:pt x="7492030" y="63319"/>
+                    <a:pt x="7511658" y="80717"/>
+                  </a:cubicBezTo>
+                  <a:cubicBezTo>
+                    <a:pt x="7529056" y="96330"/>
+                    <a:pt x="7537531" y="94993"/>
+                    <a:pt x="7543330" y="73579"/>
+                  </a:cubicBezTo>
+                  <a:cubicBezTo>
+                    <a:pt x="7552253" y="40122"/>
+                    <a:pt x="7572773" y="16480"/>
+                    <a:pt x="7607569" y="4435"/>
+                  </a:cubicBezTo>
+                  <a:cubicBezTo>
+                    <a:pt x="7611361" y="3097"/>
+                    <a:pt x="7615598" y="978"/>
+                    <a:pt x="7619780" y="253"/>
+                  </a:cubicBezTo>
+                  <a:close/>
+                </a:path>
+              </a:pathLst>
+            </a:custGeom>
+            <a:noFill/>
+            <a:extLst>
+              <a:ext uri="{909E8E84-426E-40DD-AFC4-6F175D3DCCD1}">
+                <a14:hiddenFill xmlns:a14="http://schemas.microsoft.com/office/drawing/2010/main">
+                  <a:solidFill>
+                    <a:srgbClr val="FFFFFF"/>
+                  </a:solidFill>
+                </a14:hiddenFill>
+              </a:ext>
+            </a:extLst>
+          </p:spPr>
+        </p:pic>
+        <p:sp>
+          <p:nvSpPr>
+            <p:cNvPr id="18" name="TextBox 17">
+              <a:extLst>
+                <a:ext uri="{FF2B5EF4-FFF2-40B4-BE49-F238E27FC236}">
+                  <a16:creationId xmlns:a16="http://schemas.microsoft.com/office/drawing/2014/main" id="{3EFF14DC-C00B-6512-1269-FA0456E3E7AF}"/>
+                </a:ext>
+              </a:extLst>
+            </p:cNvPr>
+            <p:cNvSpPr txBox="1"/>
+            <p:nvPr/>
+          </p:nvSpPr>
+          <p:spPr>
+            <a:xfrm>
+              <a:off x="1929388" y="1566673"/>
+              <a:ext cx="1583833" cy="830997"/>
+            </a:xfrm>
+            <a:prstGeom prst="rect">
+              <a:avLst/>
+            </a:prstGeom>
+            <a:ln>
+              <a:noFill/>
+            </a:ln>
+            <a:effectLst>
+              <a:outerShdw blurRad="107950" dist="12700" dir="5400000" algn="ctr">
+                <a:srgbClr val="000000"/>
+              </a:outerShdw>
+            </a:effectLst>
+            <a:scene3d>
+              <a:camera prst="orthographicFront">
+                <a:rot lat="0" lon="0" rev="0"/>
+              </a:camera>
+              <a:lightRig rig="soft" dir="t">
+                <a:rot lat="0" lon="0" rev="0"/>
+              </a:lightRig>
+            </a:scene3d>
+            <a:sp3d contourW="44450" prstMaterial="matte">
+              <a:bevelT w="63500" h="63500" prst="artDeco"/>
+              <a:contourClr>
+                <a:srgbClr val="FFFFFF"/>
+              </a:contourClr>
+            </a:sp3d>
+          </p:spPr>
+          <p:style>
+            <a:lnRef idx="1">
+              <a:schemeClr val="accent6"/>
+            </a:lnRef>
+            <a:fillRef idx="2">
+              <a:schemeClr val="accent6"/>
+            </a:fillRef>
+            <a:effectRef idx="1">
+              <a:schemeClr val="accent6"/>
+            </a:effectRef>
+            <a:fontRef idx="minor">
+              <a:schemeClr val="dk1"/>
+            </a:fontRef>
+          </p:style>
+          <p:txBody>
+            <a:bodyPr wrap="square" rtlCol="0">
+              <a:spAutoFit/>
+            </a:bodyPr>
+            <a:lstStyle/>
+            <a:p>
+              <a:pPr algn="ctr"/>
+              <a:r>
+                <a:rPr lang="en-US" sz="1600" b="1" dirty="0">
+                  <a:solidFill>
+                    <a:schemeClr val="tx1"/>
+                  </a:solidFill>
+                </a:rPr>
+                <a:t>Traditional Program Analysis (PA)</a:t>
+              </a:r>
+            </a:p>
+          </p:txBody>
+        </p:sp>
+      </p:grpSp>
+      <p:grpSp>
+        <p:nvGrpSpPr>
+          <p:cNvPr id="21" name="Group 20">
+            <a:extLst>
+              <a:ext uri="{FF2B5EF4-FFF2-40B4-BE49-F238E27FC236}">
+                <a16:creationId xmlns:a16="http://schemas.microsoft.com/office/drawing/2014/main" id="{AB69EB16-6B82-A0EE-1801-A3CECDA9558B}"/>
+              </a:ext>
+            </a:extLst>
+          </p:cNvPr>
+          <p:cNvGrpSpPr/>
+          <p:nvPr/>
+        </p:nvGrpSpPr>
+        <p:grpSpPr>
+          <a:xfrm>
+            <a:off x="2407923" y="5432375"/>
+            <a:ext cx="1734553" cy="1250261"/>
+            <a:chOff x="1489910" y="4592805"/>
+            <a:chExt cx="1734553" cy="1250261"/>
+          </a:xfrm>
+        </p:grpSpPr>
+        <p:pic>
+          <p:nvPicPr>
+            <p:cNvPr id="1028" name="Picture 4" descr="BMC Compuware Topaz for Program Analysis - BMC Software">
+              <a:extLst>
+                <a:ext uri="{FF2B5EF4-FFF2-40B4-BE49-F238E27FC236}">
+                  <a16:creationId xmlns:a16="http://schemas.microsoft.com/office/drawing/2014/main" id="{99E4E51E-4F8B-DB1F-8BE5-4DDDB415D17B}"/>
+                </a:ext>
+              </a:extLst>
+            </p:cNvPr>
+            <p:cNvPicPr>
+              <a:picLocks noChangeAspect="1" noChangeArrowheads="1"/>
+            </p:cNvPicPr>
+            <p:nvPr/>
+          </p:nvPicPr>
+          <p:blipFill>
+            <a:blip r:embed="rId4">
+              <a:extLst>
+                <a:ext uri="{28A0092B-C50C-407E-A947-70E740481C1C}">
+                  <a14:useLocalDpi xmlns:a14="http://schemas.microsoft.com/office/drawing/2010/main" val="0"/>
+                </a:ext>
+              </a:extLst>
+            </a:blip>
+            <a:srcRect/>
+            <a:stretch>
+              <a:fillRect/>
+            </a:stretch>
+          </p:blipFill>
+          <p:spPr bwMode="auto">
+            <a:xfrm>
+              <a:off x="1489910" y="4592805"/>
+              <a:ext cx="1734553" cy="997368"/>
+            </a:xfrm>
+            <a:prstGeom prst="rect">
+              <a:avLst/>
+            </a:prstGeom>
+            <a:noFill/>
+            <a:extLst>
+              <a:ext uri="{909E8E84-426E-40DD-AFC4-6F175D3DCCD1}">
+                <a14:hiddenFill xmlns:a14="http://schemas.microsoft.com/office/drawing/2010/main">
+                  <a:solidFill>
+                    <a:srgbClr val="FFFFFF"/>
+                  </a:solidFill>
+                </a14:hiddenFill>
+              </a:ext>
+            </a:extLst>
+          </p:spPr>
+        </p:pic>
+        <p:sp>
+          <p:nvSpPr>
+            <p:cNvPr id="20" name="TextBox 19">
+              <a:extLst>
+                <a:ext uri="{FF2B5EF4-FFF2-40B4-BE49-F238E27FC236}">
+                  <a16:creationId xmlns:a16="http://schemas.microsoft.com/office/drawing/2014/main" id="{E5F9F59F-039A-F495-A28C-ABB150A74E00}"/>
+                </a:ext>
+              </a:extLst>
+            </p:cNvPr>
+            <p:cNvSpPr txBox="1"/>
+            <p:nvPr/>
+          </p:nvSpPr>
+          <p:spPr>
+            <a:xfrm>
+              <a:off x="1577808" y="5504512"/>
+              <a:ext cx="1558756" cy="338554"/>
+            </a:xfrm>
+            <a:prstGeom prst="rect">
+              <a:avLst/>
+            </a:prstGeom>
+            <a:noFill/>
+            <a:ln>
+              <a:noFill/>
+            </a:ln>
+          </p:spPr>
+          <p:style>
+            <a:lnRef idx="0">
+              <a:scrgbClr r="0" g="0" b="0"/>
+            </a:lnRef>
+            <a:fillRef idx="0">
+              <a:scrgbClr r="0" g="0" b="0"/>
+            </a:fillRef>
+            <a:effectRef idx="0">
+              <a:scrgbClr r="0" g="0" b="0"/>
+            </a:effectRef>
+            <a:fontRef idx="minor">
+              <a:schemeClr val="lt1"/>
+            </a:fontRef>
+          </p:style>
+          <p:txBody>
+            <a:bodyPr wrap="square" rtlCol="0">
+              <a:spAutoFit/>
+            </a:bodyPr>
+            <a:lstStyle/>
+            <a:p>
+              <a:pPr algn="ctr"/>
+              <a:r>
+                <a:rPr lang="en-US" sz="1600" dirty="0">
+                  <a:solidFill>
+                    <a:schemeClr val="tx1"/>
+                  </a:solidFill>
+                </a:rPr>
+                <a:t>Complete Code</a:t>
+              </a:r>
+            </a:p>
+          </p:txBody>
+        </p:sp>
+      </p:grpSp>
+      <p:sp>
+        <p:nvSpPr>
+          <p:cNvPr id="24" name="TextBox 23">
+            <a:extLst>
+              <a:ext uri="{FF2B5EF4-FFF2-40B4-BE49-F238E27FC236}">
+                <a16:creationId xmlns:a16="http://schemas.microsoft.com/office/drawing/2014/main" id="{20DBF0A0-DBAF-9790-8F74-6352A1F40D1A}"/>
+              </a:ext>
+            </a:extLst>
+          </p:cNvPr>
+          <p:cNvSpPr txBox="1"/>
+          <p:nvPr/>
+        </p:nvSpPr>
+        <p:spPr>
+          <a:xfrm>
+            <a:off x="4592526" y="4533793"/>
+            <a:ext cx="1558756" cy="584775"/>
+          </a:xfrm>
+          <a:prstGeom prst="rect">
+            <a:avLst/>
+          </a:prstGeom>
+          <a:noFill/>
+          <a:ln>
+            <a:noFill/>
+          </a:ln>
+        </p:spPr>
+        <p:style>
+          <a:lnRef idx="0">
+            <a:scrgbClr r="0" g="0" b="0"/>
+          </a:lnRef>
+          <a:fillRef idx="0">
+            <a:scrgbClr r="0" g="0" b="0"/>
+          </a:fillRef>
+          <a:effectRef idx="0">
+            <a:scrgbClr r="0" g="0" b="0"/>
+          </a:effectRef>
+          <a:fontRef idx="minor">
+            <a:schemeClr val="lt1"/>
+          </a:fontRef>
+        </p:style>
+        <p:txBody>
+          <a:bodyPr wrap="square" rtlCol="0">
+            <a:spAutoFit/>
+          </a:bodyPr>
+          <a:lstStyle/>
+          <a:p>
+            <a:pPr algn="ctr"/>
+            <a:r>
+              <a:rPr lang="en-US" sz="1600" b="1" dirty="0">
+                <a:solidFill>
+                  <a:srgbClr val="FF0000"/>
+                </a:solidFill>
+              </a:rPr>
+              <a:t>Empowering PA with AI/ML</a:t>
+            </a:r>
+          </a:p>
+        </p:txBody>
+      </p:sp>
+      <p:grpSp>
+        <p:nvGrpSpPr>
+          <p:cNvPr id="31" name="Group 30">
+            <a:extLst>
+              <a:ext uri="{FF2B5EF4-FFF2-40B4-BE49-F238E27FC236}">
+                <a16:creationId xmlns:a16="http://schemas.microsoft.com/office/drawing/2014/main" id="{D7CE1667-79AA-34DE-053E-2A3EE59A3A40}"/>
+              </a:ext>
+            </a:extLst>
+          </p:cNvPr>
+          <p:cNvGrpSpPr/>
+          <p:nvPr/>
+        </p:nvGrpSpPr>
+        <p:grpSpPr>
+          <a:xfrm>
+            <a:off x="6833684" y="4606709"/>
+            <a:ext cx="1664187" cy="1790820"/>
+            <a:chOff x="7612160" y="3507943"/>
+            <a:chExt cx="1664187" cy="1790820"/>
+          </a:xfrm>
+        </p:grpSpPr>
+        <p:pic>
+          <p:nvPicPr>
+            <p:cNvPr id="29" name="Picture 28">
+              <a:extLst>
+                <a:ext uri="{FF2B5EF4-FFF2-40B4-BE49-F238E27FC236}">
+                  <a16:creationId xmlns:a16="http://schemas.microsoft.com/office/drawing/2014/main" id="{23A98A34-BFE1-72E4-303F-CC64EB1F2A4C}"/>
+                </a:ext>
+              </a:extLst>
+            </p:cNvPr>
+            <p:cNvPicPr>
+              <a:picLocks noChangeAspect="1"/>
+            </p:cNvPicPr>
+            <p:nvPr/>
+          </p:nvPicPr>
+          <p:blipFill>
+            <a:blip r:embed="rId5"/>
+            <a:stretch>
+              <a:fillRect/>
+            </a:stretch>
+          </p:blipFill>
+          <p:spPr>
+            <a:xfrm>
+              <a:off x="7612160" y="3507943"/>
+              <a:ext cx="1664187" cy="1206045"/>
+            </a:xfrm>
+            <a:prstGeom prst="rect">
+              <a:avLst/>
+            </a:prstGeom>
+          </p:spPr>
+        </p:pic>
+        <p:sp>
+          <p:nvSpPr>
+            <p:cNvPr id="30" name="TextBox 29">
+              <a:extLst>
+                <a:ext uri="{FF2B5EF4-FFF2-40B4-BE49-F238E27FC236}">
+                  <a16:creationId xmlns:a16="http://schemas.microsoft.com/office/drawing/2014/main" id="{9E0DA739-0135-FA1B-63C0-590692A5D4E8}"/>
+                </a:ext>
+              </a:extLst>
+            </p:cNvPr>
+            <p:cNvSpPr txBox="1"/>
+            <p:nvPr/>
+          </p:nvSpPr>
+          <p:spPr>
+            <a:xfrm>
+              <a:off x="7664875" y="4713988"/>
+              <a:ext cx="1558756" cy="584775"/>
+            </a:xfrm>
+            <a:prstGeom prst="rect">
+              <a:avLst/>
+            </a:prstGeom>
+            <a:noFill/>
+            <a:ln>
+              <a:noFill/>
+            </a:ln>
+          </p:spPr>
+          <p:style>
+            <a:lnRef idx="0">
+              <a:scrgbClr r="0" g="0" b="0"/>
+            </a:lnRef>
+            <a:fillRef idx="0">
+              <a:scrgbClr r="0" g="0" b="0"/>
+            </a:fillRef>
+            <a:effectRef idx="0">
+              <a:scrgbClr r="0" g="0" b="0"/>
+            </a:effectRef>
+            <a:fontRef idx="minor">
+              <a:schemeClr val="lt1"/>
+            </a:fontRef>
+          </p:style>
+          <p:txBody>
+            <a:bodyPr wrap="square" rtlCol="0">
+              <a:spAutoFit/>
+            </a:bodyPr>
+            <a:lstStyle/>
+            <a:p>
+              <a:pPr algn="ctr"/>
+              <a:r>
+                <a:rPr lang="en-US" sz="1600" dirty="0">
+                  <a:solidFill>
+                    <a:schemeClr val="tx1"/>
+                  </a:solidFill>
+                </a:rPr>
+                <a:t>Incomplete Code Fragments</a:t>
+              </a:r>
+            </a:p>
+          </p:txBody>
+        </p:sp>
+      </p:grpSp>
+      <p:sp>
+        <p:nvSpPr>
+          <p:cNvPr id="32" name="Arrow: Down 31">
+            <a:extLst>
+              <a:ext uri="{FF2B5EF4-FFF2-40B4-BE49-F238E27FC236}">
+                <a16:creationId xmlns:a16="http://schemas.microsoft.com/office/drawing/2014/main" id="{46E7DA84-1931-91CA-A9CB-D52BFCC4BD53}"/>
+              </a:ext>
+            </a:extLst>
+          </p:cNvPr>
+          <p:cNvSpPr/>
+          <p:nvPr/>
+        </p:nvSpPr>
+        <p:spPr>
+          <a:xfrm>
+            <a:off x="3174132" y="4933123"/>
+            <a:ext cx="234616" cy="499252"/>
+          </a:xfrm>
+          <a:prstGeom prst="downArrow">
+            <a:avLst/>
+          </a:prstGeom>
+          <a:noFill/>
+        </p:spPr>
+        <p:style>
+          <a:lnRef idx="2">
+            <a:schemeClr val="accent1">
+              <a:shade val="50000"/>
+            </a:schemeClr>
+          </a:lnRef>
+          <a:fillRef idx="1">
+            <a:schemeClr val="accent1"/>
+          </a:fillRef>
+          <a:effectRef idx="0">
+            <a:schemeClr val="accent1"/>
+          </a:effectRef>
+          <a:fontRef idx="minor">
+            <a:schemeClr val="lt1"/>
+          </a:fontRef>
+        </p:style>
+        <p:txBody>
+          <a:bodyPr rtlCol="0" anchor="ctr"/>
+          <a:lstStyle/>
+          <a:p>
+            <a:pPr algn="ctr"/>
+            <a:endParaRPr lang="en-US">
+              <a:noFill/>
+            </a:endParaRPr>
+          </a:p>
+        </p:txBody>
+      </p:sp>
+      <p:sp>
+        <p:nvSpPr>
+          <p:cNvPr id="33" name="Arrow: Down 32">
+            <a:extLst>
+              <a:ext uri="{FF2B5EF4-FFF2-40B4-BE49-F238E27FC236}">
+                <a16:creationId xmlns:a16="http://schemas.microsoft.com/office/drawing/2014/main" id="{B8EAE08E-5263-1E5B-5BDF-B003856C6EA0}"/>
+              </a:ext>
+            </a:extLst>
+          </p:cNvPr>
+          <p:cNvSpPr/>
+          <p:nvPr/>
+        </p:nvSpPr>
+        <p:spPr>
+          <a:xfrm>
+            <a:off x="7620893" y="4119295"/>
+            <a:ext cx="234616" cy="499252"/>
+          </a:xfrm>
+          <a:prstGeom prst="downArrow">
+            <a:avLst/>
+          </a:prstGeom>
+          <a:noFill/>
+        </p:spPr>
+        <p:style>
+          <a:lnRef idx="2">
+            <a:schemeClr val="accent1">
+              <a:shade val="50000"/>
+            </a:schemeClr>
+          </a:lnRef>
+          <a:fillRef idx="1">
+            <a:schemeClr val="accent1"/>
+          </a:fillRef>
+          <a:effectRef idx="0">
+            <a:schemeClr val="accent1"/>
+          </a:effectRef>
+          <a:fontRef idx="minor">
+            <a:schemeClr val="lt1"/>
+          </a:fontRef>
+        </p:style>
+        <p:txBody>
+          <a:bodyPr rtlCol="0" anchor="ctr"/>
+          <a:lstStyle/>
+          <a:p>
+            <a:pPr algn="ctr"/>
+            <a:endParaRPr lang="en-US">
+              <a:noFill/>
+            </a:endParaRPr>
+          </a:p>
+        </p:txBody>
+      </p:sp>
+      <p:grpSp>
+        <p:nvGrpSpPr>
+          <p:cNvPr id="40" name="Group 39">
+            <a:extLst>
+              <a:ext uri="{FF2B5EF4-FFF2-40B4-BE49-F238E27FC236}">
+                <a16:creationId xmlns:a16="http://schemas.microsoft.com/office/drawing/2014/main" id="{39DAF9B7-725C-F9D3-42E0-B071139B4D43}"/>
+              </a:ext>
+            </a:extLst>
+          </p:cNvPr>
+          <p:cNvGrpSpPr/>
+          <p:nvPr/>
+        </p:nvGrpSpPr>
+        <p:grpSpPr>
+          <a:xfrm>
+            <a:off x="9128096" y="688275"/>
+            <a:ext cx="2095379" cy="1485814"/>
+            <a:chOff x="9934152" y="1167064"/>
+            <a:chExt cx="2095379" cy="1485814"/>
+          </a:xfrm>
+        </p:grpSpPr>
+        <p:pic>
+          <p:nvPicPr>
+            <p:cNvPr id="34" name="Picture 2" descr="security vulnerability detection">
+              <a:extLst>
+                <a:ext uri="{FF2B5EF4-FFF2-40B4-BE49-F238E27FC236}">
+                  <a16:creationId xmlns:a16="http://schemas.microsoft.com/office/drawing/2014/main" id="{409FB4B1-8061-85BF-4AFF-2EECA42030DD}"/>
+                </a:ext>
+              </a:extLst>
+            </p:cNvPr>
+            <p:cNvPicPr>
+              <a:picLocks noChangeAspect="1" noChangeArrowheads="1"/>
+            </p:cNvPicPr>
+            <p:nvPr/>
+          </p:nvPicPr>
+          <p:blipFill>
+            <a:blip r:embed="rId6">
+              <a:extLst>
+                <a:ext uri="{28A0092B-C50C-407E-A947-70E740481C1C}">
+                  <a14:useLocalDpi xmlns:a14="http://schemas.microsoft.com/office/drawing/2010/main" val="0"/>
+                </a:ext>
+              </a:extLst>
+            </a:blip>
+            <a:srcRect/>
+            <a:stretch>
+              <a:fillRect/>
+            </a:stretch>
+          </p:blipFill>
+          <p:spPr bwMode="auto">
+            <a:xfrm>
+              <a:off x="10197476" y="1167064"/>
+              <a:ext cx="1568733" cy="903936"/>
+            </a:xfrm>
+            <a:prstGeom prst="rect">
+              <a:avLst/>
+            </a:prstGeom>
+            <a:noFill/>
+            <a:extLst>
+              <a:ext uri="{909E8E84-426E-40DD-AFC4-6F175D3DCCD1}">
+                <a14:hiddenFill xmlns:a14="http://schemas.microsoft.com/office/drawing/2010/main">
+                  <a:solidFill>
+                    <a:srgbClr val="FFFFFF"/>
+                  </a:solidFill>
+                </a14:hiddenFill>
+              </a:ext>
+            </a:extLst>
+          </p:spPr>
+        </p:pic>
+        <p:sp>
+          <p:nvSpPr>
+            <p:cNvPr id="35" name="TextBox 34">
+              <a:extLst>
+                <a:ext uri="{FF2B5EF4-FFF2-40B4-BE49-F238E27FC236}">
+                  <a16:creationId xmlns:a16="http://schemas.microsoft.com/office/drawing/2014/main" id="{4DB9F30C-1221-8D47-88B2-055A3B48BFE7}"/>
+                </a:ext>
+              </a:extLst>
+            </p:cNvPr>
+            <p:cNvSpPr txBox="1"/>
+            <p:nvPr/>
+          </p:nvSpPr>
+          <p:spPr>
+            <a:xfrm>
+              <a:off x="9934152" y="2068103"/>
+              <a:ext cx="2095379" cy="584775"/>
+            </a:xfrm>
+            <a:prstGeom prst="rect">
+              <a:avLst/>
+            </a:prstGeom>
+            <a:noFill/>
+            <a:ln>
+              <a:noFill/>
+            </a:ln>
+          </p:spPr>
+          <p:style>
+            <a:lnRef idx="0">
+              <a:scrgbClr r="0" g="0" b="0"/>
+            </a:lnRef>
+            <a:fillRef idx="0">
+              <a:scrgbClr r="0" g="0" b="0"/>
+            </a:fillRef>
+            <a:effectRef idx="0">
+              <a:scrgbClr r="0" g="0" b="0"/>
+            </a:effectRef>
+            <a:fontRef idx="minor">
+              <a:schemeClr val="lt1"/>
+            </a:fontRef>
+          </p:style>
+          <p:txBody>
+            <a:bodyPr wrap="square" rtlCol="0">
+              <a:spAutoFit/>
+            </a:bodyPr>
+            <a:lstStyle/>
+            <a:p>
+              <a:pPr algn="ctr"/>
+              <a:r>
+                <a:rPr lang="en-US" sz="1600" dirty="0">
+                  <a:solidFill>
+                    <a:schemeClr val="tx1"/>
+                  </a:solidFill>
+                </a:rPr>
+                <a:t>Security Vulnerability Detection</a:t>
+              </a:r>
+            </a:p>
+          </p:txBody>
+        </p:sp>
+      </p:grpSp>
+      <p:grpSp>
+        <p:nvGrpSpPr>
+          <p:cNvPr id="41" name="Group 40">
+            <a:extLst>
+              <a:ext uri="{FF2B5EF4-FFF2-40B4-BE49-F238E27FC236}">
+                <a16:creationId xmlns:a16="http://schemas.microsoft.com/office/drawing/2014/main" id="{18893617-31BC-0660-B433-6D00CEDC084F}"/>
+              </a:ext>
+            </a:extLst>
+          </p:cNvPr>
+          <p:cNvGrpSpPr/>
+          <p:nvPr/>
+        </p:nvGrpSpPr>
+        <p:grpSpPr>
+          <a:xfrm>
+            <a:off x="9201121" y="2199216"/>
+            <a:ext cx="1783898" cy="1313688"/>
+            <a:chOff x="9982311" y="2891435"/>
+            <a:chExt cx="1783898" cy="1313688"/>
+          </a:xfrm>
+        </p:grpSpPr>
+        <p:pic>
+          <p:nvPicPr>
+            <p:cNvPr id="36" name="Picture 4" descr="3 Effective Testing Techniques for Quick Software Bug Detection | Software  Testing Tips and Tricks">
+              <a:extLst>
+                <a:ext uri="{FF2B5EF4-FFF2-40B4-BE49-F238E27FC236}">
+                  <a16:creationId xmlns:a16="http://schemas.microsoft.com/office/drawing/2014/main" id="{D510E95D-0965-EE28-2AF3-202E22EAADFB}"/>
+                </a:ext>
+              </a:extLst>
+            </p:cNvPr>
+            <p:cNvPicPr>
+              <a:picLocks noChangeAspect="1" noChangeArrowheads="1"/>
+            </p:cNvPicPr>
+            <p:nvPr/>
+          </p:nvPicPr>
+          <p:blipFill>
+            <a:blip r:embed="rId7">
+              <a:extLst>
+                <a:ext uri="{28A0092B-C50C-407E-A947-70E740481C1C}">
+                  <a14:useLocalDpi xmlns:a14="http://schemas.microsoft.com/office/drawing/2010/main" val="0"/>
+                </a:ext>
+              </a:extLst>
+            </a:blip>
+            <a:srcRect/>
+            <a:stretch>
+              <a:fillRect/>
+            </a:stretch>
+          </p:blipFill>
+          <p:spPr bwMode="auto">
+            <a:xfrm flipH="1">
+              <a:off x="10185135" y="2891435"/>
+              <a:ext cx="1534182" cy="958864"/>
+            </a:xfrm>
+            <a:prstGeom prst="rect">
+              <a:avLst/>
+            </a:prstGeom>
+            <a:noFill/>
+            <a:extLst>
+              <a:ext uri="{909E8E84-426E-40DD-AFC4-6F175D3DCCD1}">
+                <a14:hiddenFill xmlns:a14="http://schemas.microsoft.com/office/drawing/2010/main">
+                  <a:solidFill>
+                    <a:srgbClr val="FFFFFF"/>
+                  </a:solidFill>
+                </a14:hiddenFill>
+              </a:ext>
+            </a:extLst>
+          </p:spPr>
+        </p:pic>
+        <p:sp>
+          <p:nvSpPr>
+            <p:cNvPr id="37" name="TextBox 36">
+              <a:extLst>
+                <a:ext uri="{FF2B5EF4-FFF2-40B4-BE49-F238E27FC236}">
+                  <a16:creationId xmlns:a16="http://schemas.microsoft.com/office/drawing/2014/main" id="{D0385394-62AB-0827-5F9C-7134ECE7EAAE}"/>
+                </a:ext>
+              </a:extLst>
+            </p:cNvPr>
+            <p:cNvSpPr txBox="1"/>
+            <p:nvPr/>
+          </p:nvSpPr>
+          <p:spPr>
+            <a:xfrm>
+              <a:off x="9982311" y="3866569"/>
+              <a:ext cx="1783898" cy="338554"/>
+            </a:xfrm>
+            <a:prstGeom prst="rect">
+              <a:avLst/>
+            </a:prstGeom>
+            <a:noFill/>
+            <a:ln>
+              <a:noFill/>
+            </a:ln>
+          </p:spPr>
+          <p:style>
+            <a:lnRef idx="0">
+              <a:scrgbClr r="0" g="0" b="0"/>
+            </a:lnRef>
+            <a:fillRef idx="0">
+              <a:scrgbClr r="0" g="0" b="0"/>
+            </a:fillRef>
+            <a:effectRef idx="0">
+              <a:scrgbClr r="0" g="0" b="0"/>
+            </a:effectRef>
+            <a:fontRef idx="minor">
+              <a:schemeClr val="lt1"/>
+            </a:fontRef>
+          </p:style>
+          <p:txBody>
+            <a:bodyPr wrap="square" rtlCol="0">
+              <a:spAutoFit/>
+            </a:bodyPr>
+            <a:lstStyle/>
+            <a:p>
+              <a:pPr algn="ctr"/>
+              <a:r>
+                <a:rPr lang="en-US" sz="1600" dirty="0">
+                  <a:solidFill>
+                    <a:schemeClr val="tx1"/>
+                  </a:solidFill>
+                </a:rPr>
+                <a:t>Fault Localization</a:t>
+              </a:r>
+            </a:p>
+          </p:txBody>
+        </p:sp>
+      </p:grpSp>
+      <p:grpSp>
+        <p:nvGrpSpPr>
+          <p:cNvPr id="42" name="Group 41">
+            <a:extLst>
+              <a:ext uri="{FF2B5EF4-FFF2-40B4-BE49-F238E27FC236}">
+                <a16:creationId xmlns:a16="http://schemas.microsoft.com/office/drawing/2014/main" id="{35CEEE9E-B637-BED8-8D1B-996B72C1D63D}"/>
+              </a:ext>
+            </a:extLst>
+          </p:cNvPr>
+          <p:cNvGrpSpPr/>
+          <p:nvPr/>
+        </p:nvGrpSpPr>
+        <p:grpSpPr>
+          <a:xfrm>
+            <a:off x="9303170" y="3647210"/>
+            <a:ext cx="1758027" cy="1519484"/>
+            <a:chOff x="10061793" y="4258298"/>
+            <a:chExt cx="1758027" cy="1519484"/>
+          </a:xfrm>
+        </p:grpSpPr>
+        <p:pic>
+          <p:nvPicPr>
+            <p:cNvPr id="38" name="Picture 6" descr="Code Completion | The IntelliJ IDEA Blog">
+              <a:extLst>
+                <a:ext uri="{FF2B5EF4-FFF2-40B4-BE49-F238E27FC236}">
+                  <a16:creationId xmlns:a16="http://schemas.microsoft.com/office/drawing/2014/main" id="{C5A5F9F6-E15E-16D4-081E-3153C7957C93}"/>
+                </a:ext>
+              </a:extLst>
+            </p:cNvPr>
+            <p:cNvPicPr>
+              <a:picLocks noChangeAspect="1" noChangeArrowheads="1"/>
+            </p:cNvPicPr>
+            <p:nvPr/>
+          </p:nvPicPr>
+          <p:blipFill>
+            <a:blip r:embed="rId8">
+              <a:extLst>
+                <a:ext uri="{28A0092B-C50C-407E-A947-70E740481C1C}">
+                  <a14:useLocalDpi xmlns:a14="http://schemas.microsoft.com/office/drawing/2010/main" val="0"/>
+                </a:ext>
+              </a:extLst>
+            </a:blip>
+            <a:srcRect/>
+            <a:stretch>
+              <a:fillRect/>
+            </a:stretch>
+          </p:blipFill>
+          <p:spPr bwMode="auto">
+            <a:xfrm>
+              <a:off x="10172619" y="4258298"/>
+              <a:ext cx="1571023" cy="830998"/>
+            </a:xfrm>
+            <a:prstGeom prst="rect">
+              <a:avLst/>
+            </a:prstGeom>
+            <a:noFill/>
+            <a:extLst>
+              <a:ext uri="{909E8E84-426E-40DD-AFC4-6F175D3DCCD1}">
+                <a14:hiddenFill xmlns:a14="http://schemas.microsoft.com/office/drawing/2010/main">
+                  <a:solidFill>
+                    <a:srgbClr val="FFFFFF"/>
+                  </a:solidFill>
+                </a14:hiddenFill>
+              </a:ext>
+            </a:extLst>
+          </p:spPr>
+        </p:pic>
+        <p:sp>
+          <p:nvSpPr>
+            <p:cNvPr id="39" name="TextBox 38">
+              <a:extLst>
+                <a:ext uri="{FF2B5EF4-FFF2-40B4-BE49-F238E27FC236}">
+                  <a16:creationId xmlns:a16="http://schemas.microsoft.com/office/drawing/2014/main" id="{A11DBC24-0367-B5C9-F82E-C759A9C1AFF6}"/>
+                </a:ext>
+              </a:extLst>
+            </p:cNvPr>
+            <p:cNvSpPr txBox="1"/>
+            <p:nvPr/>
+          </p:nvSpPr>
+          <p:spPr>
+            <a:xfrm>
+              <a:off x="10061793" y="5193007"/>
+              <a:ext cx="1758027" cy="584775"/>
+            </a:xfrm>
+            <a:prstGeom prst="rect">
+              <a:avLst/>
+            </a:prstGeom>
+            <a:noFill/>
+            <a:ln>
+              <a:noFill/>
+            </a:ln>
+          </p:spPr>
+          <p:style>
+            <a:lnRef idx="0">
+              <a:scrgbClr r="0" g="0" b="0"/>
+            </a:lnRef>
+            <a:fillRef idx="0">
+              <a:scrgbClr r="0" g="0" b="0"/>
+            </a:fillRef>
+            <a:effectRef idx="0">
+              <a:scrgbClr r="0" g="0" b="0"/>
+            </a:effectRef>
+            <a:fontRef idx="minor">
+              <a:schemeClr val="lt1"/>
+            </a:fontRef>
+          </p:style>
+          <p:txBody>
+            <a:bodyPr wrap="square" rtlCol="0">
+              <a:spAutoFit/>
+            </a:bodyPr>
+            <a:lstStyle/>
+            <a:p>
+              <a:pPr algn="ctr"/>
+              <a:r>
+                <a:rPr lang="en-US" sz="1600" dirty="0">
+                  <a:solidFill>
+                    <a:schemeClr val="tx1"/>
+                  </a:solidFill>
+                </a:rPr>
+                <a:t>Code Completion/ </a:t>
+              </a:r>
+            </a:p>
+            <a:p>
+              <a:pPr algn="ctr"/>
+              <a:r>
+                <a:rPr lang="en-US" sz="1600" dirty="0">
+                  <a:solidFill>
+                    <a:schemeClr val="tx1"/>
+                  </a:solidFill>
+                </a:rPr>
+                <a:t>Recommendation</a:t>
+              </a:r>
+            </a:p>
+          </p:txBody>
+        </p:sp>
+      </p:grpSp>
+      <p:grpSp>
+        <p:nvGrpSpPr>
+          <p:cNvPr id="44" name="Group 43">
+            <a:extLst>
+              <a:ext uri="{FF2B5EF4-FFF2-40B4-BE49-F238E27FC236}">
+                <a16:creationId xmlns:a16="http://schemas.microsoft.com/office/drawing/2014/main" id="{73ED45BC-FB02-253A-A97D-3CEBF4D12BC8}"/>
+              </a:ext>
+            </a:extLst>
+          </p:cNvPr>
+          <p:cNvGrpSpPr/>
+          <p:nvPr/>
+        </p:nvGrpSpPr>
+        <p:grpSpPr>
+          <a:xfrm>
+            <a:off x="9436268" y="5102956"/>
+            <a:ext cx="1624930" cy="1410403"/>
+            <a:chOff x="10017107" y="5127378"/>
+            <a:chExt cx="1624930" cy="1410403"/>
+          </a:xfrm>
+        </p:grpSpPr>
+        <p:pic>
+          <p:nvPicPr>
+            <p:cNvPr id="1038" name="Picture 14" descr="What Is Configuration Management? | Tanium">
+              <a:extLst>
+                <a:ext uri="{FF2B5EF4-FFF2-40B4-BE49-F238E27FC236}">
+                  <a16:creationId xmlns:a16="http://schemas.microsoft.com/office/drawing/2014/main" id="{0111E685-6BAB-2856-4365-E17F836C5CDA}"/>
+                </a:ext>
+              </a:extLst>
+            </p:cNvPr>
+            <p:cNvPicPr>
+              <a:picLocks noChangeAspect="1" noChangeArrowheads="1"/>
+            </p:cNvPicPr>
+            <p:nvPr/>
+          </p:nvPicPr>
+          <p:blipFill>
+            <a:blip r:embed="rId9">
+              <a:extLst>
+                <a:ext uri="{28A0092B-C50C-407E-A947-70E740481C1C}">
+                  <a14:useLocalDpi xmlns:a14="http://schemas.microsoft.com/office/drawing/2010/main" val="0"/>
+                </a:ext>
+              </a:extLst>
+            </a:blip>
+            <a:srcRect/>
+            <a:stretch>
+              <a:fillRect/>
+            </a:stretch>
+          </p:blipFill>
+          <p:spPr bwMode="auto">
+            <a:xfrm>
+              <a:off x="10129014" y="5127378"/>
+              <a:ext cx="1204829" cy="1052763"/>
+            </a:xfrm>
+            <a:prstGeom prst="rect">
+              <a:avLst/>
+            </a:prstGeom>
+            <a:noFill/>
+            <a:extLst>
+              <a:ext uri="{909E8E84-426E-40DD-AFC4-6F175D3DCCD1}">
+                <a14:hiddenFill xmlns:a14="http://schemas.microsoft.com/office/drawing/2010/main">
+                  <a:solidFill>
+                    <a:srgbClr val="FFFFFF"/>
+                  </a:solidFill>
+                </a14:hiddenFill>
+              </a:ext>
+            </a:extLst>
+          </p:spPr>
+        </p:pic>
+        <p:sp>
+          <p:nvSpPr>
+            <p:cNvPr id="43" name="TextBox 42">
+              <a:extLst>
+                <a:ext uri="{FF2B5EF4-FFF2-40B4-BE49-F238E27FC236}">
+                  <a16:creationId xmlns:a16="http://schemas.microsoft.com/office/drawing/2014/main" id="{AE25BA1B-6E7F-8C5A-B743-CEA8F2722BCD}"/>
+                </a:ext>
+              </a:extLst>
+            </p:cNvPr>
+            <p:cNvSpPr txBox="1"/>
+            <p:nvPr/>
+          </p:nvSpPr>
+          <p:spPr>
+            <a:xfrm>
+              <a:off x="10017107" y="5953006"/>
+              <a:ext cx="1624930" cy="584775"/>
+            </a:xfrm>
+            <a:prstGeom prst="rect">
+              <a:avLst/>
+            </a:prstGeom>
+            <a:noFill/>
+            <a:ln>
+              <a:noFill/>
+            </a:ln>
+          </p:spPr>
+          <p:style>
+            <a:lnRef idx="0">
+              <a:scrgbClr r="0" g="0" b="0"/>
+            </a:lnRef>
+            <a:fillRef idx="0">
+              <a:scrgbClr r="0" g="0" b="0"/>
+            </a:fillRef>
+            <a:effectRef idx="0">
+              <a:scrgbClr r="0" g="0" b="0"/>
+            </a:effectRef>
+            <a:fontRef idx="minor">
+              <a:schemeClr val="lt1"/>
+            </a:fontRef>
+          </p:style>
+          <p:txBody>
+            <a:bodyPr wrap="square" rtlCol="0">
+              <a:spAutoFit/>
+            </a:bodyPr>
+            <a:lstStyle/>
+            <a:p>
+              <a:pPr algn="ctr"/>
+              <a:r>
+                <a:rPr lang="en-US" sz="1600" dirty="0">
+                  <a:solidFill>
+                    <a:schemeClr val="tx1"/>
+                  </a:solidFill>
+                </a:rPr>
+                <a:t>Configurable Code Analysis</a:t>
+              </a:r>
+            </a:p>
+          </p:txBody>
+        </p:sp>
+      </p:grpSp>
+      <p:sp>
+        <p:nvSpPr>
+          <p:cNvPr id="45" name="Rectangle 44">
+            <a:extLst>
+              <a:ext uri="{FF2B5EF4-FFF2-40B4-BE49-F238E27FC236}">
+                <a16:creationId xmlns:a16="http://schemas.microsoft.com/office/drawing/2014/main" id="{11D47CA1-37FF-E809-5093-7BAC32CEF487}"/>
+              </a:ext>
+            </a:extLst>
+          </p:cNvPr>
+          <p:cNvSpPr/>
+          <p:nvPr/>
+        </p:nvSpPr>
+        <p:spPr>
+          <a:xfrm>
+            <a:off x="9235975" y="320219"/>
+            <a:ext cx="1900720" cy="6327227"/>
+          </a:xfrm>
+          <a:prstGeom prst="rect">
+            <a:avLst/>
+          </a:prstGeom>
+          <a:noFill/>
+          <a:ln>
+            <a:prstDash val="dash"/>
+          </a:ln>
+        </p:spPr>
+        <p:style>
+          <a:lnRef idx="2">
+            <a:schemeClr val="accent5"/>
+          </a:lnRef>
+          <a:fillRef idx="1">
+            <a:schemeClr val="lt1"/>
+          </a:fillRef>
+          <a:effectRef idx="0">
+            <a:schemeClr val="accent5"/>
+          </a:effectRef>
+          <a:fontRef idx="minor">
+            <a:schemeClr val="dk1"/>
+          </a:fontRef>
+        </p:style>
+        <p:txBody>
+          <a:bodyPr rtlCol="0" anchor="ctr"/>
+          <a:lstStyle/>
+          <a:p>
+            <a:pPr algn="ctr"/>
+            <a:endParaRPr lang="en-US" dirty="0"/>
+          </a:p>
+        </p:txBody>
+      </p:sp>
+      <p:sp>
+        <p:nvSpPr>
+          <p:cNvPr id="46" name="TextBox 45">
+            <a:extLst>
+              <a:ext uri="{FF2B5EF4-FFF2-40B4-BE49-F238E27FC236}">
+                <a16:creationId xmlns:a16="http://schemas.microsoft.com/office/drawing/2014/main" id="{20897A2E-CDCB-A6FD-09E4-20F61856D35F}"/>
+              </a:ext>
+            </a:extLst>
+          </p:cNvPr>
+          <p:cNvSpPr txBox="1"/>
+          <p:nvPr/>
+        </p:nvSpPr>
+        <p:spPr>
+          <a:xfrm>
+            <a:off x="9204771" y="294529"/>
+            <a:ext cx="1257040" cy="338554"/>
+          </a:xfrm>
+          <a:prstGeom prst="rect">
+            <a:avLst/>
+          </a:prstGeom>
+          <a:noFill/>
+          <a:ln>
+            <a:noFill/>
+          </a:ln>
+        </p:spPr>
+        <p:style>
+          <a:lnRef idx="0">
+            <a:scrgbClr r="0" g="0" b="0"/>
+          </a:lnRef>
+          <a:fillRef idx="0">
+            <a:scrgbClr r="0" g="0" b="0"/>
+          </a:fillRef>
+          <a:effectRef idx="0">
+            <a:scrgbClr r="0" g="0" b="0"/>
+          </a:effectRef>
+          <a:fontRef idx="minor">
+            <a:schemeClr val="lt1"/>
+          </a:fontRef>
+        </p:style>
+        <p:txBody>
+          <a:bodyPr wrap="square" rtlCol="0">
+            <a:spAutoFit/>
+          </a:bodyPr>
+          <a:lstStyle/>
+          <a:p>
+            <a:pPr algn="ctr"/>
+            <a:r>
+              <a:rPr lang="en-US" sz="1600" b="1" dirty="0">
+                <a:solidFill>
+                  <a:schemeClr val="accent1">
+                    <a:lumMod val="50000"/>
+                  </a:schemeClr>
+                </a:solidFill>
+              </a:rPr>
+              <a:t>Applications</a:t>
+            </a:r>
+            <a:endParaRPr lang="en-US" sz="1600" dirty="0">
+              <a:solidFill>
+                <a:schemeClr val="accent1">
+                  <a:lumMod val="50000"/>
+                </a:schemeClr>
+              </a:solidFill>
+            </a:endParaRPr>
+          </a:p>
+        </p:txBody>
+      </p:sp>
+      <p:sp>
+        <p:nvSpPr>
+          <p:cNvPr id="47" name="TextBox 46">
+            <a:extLst>
+              <a:ext uri="{FF2B5EF4-FFF2-40B4-BE49-F238E27FC236}">
+                <a16:creationId xmlns:a16="http://schemas.microsoft.com/office/drawing/2014/main" id="{B84042F3-F1E0-ED2B-CD16-B918EC8FABD4}"/>
+              </a:ext>
+            </a:extLst>
+          </p:cNvPr>
+          <p:cNvSpPr txBox="1"/>
+          <p:nvPr/>
+        </p:nvSpPr>
+        <p:spPr>
+          <a:xfrm>
+            <a:off x="6600314" y="3288298"/>
+            <a:ext cx="2267953" cy="830997"/>
+          </a:xfrm>
+          <a:prstGeom prst="rect">
+            <a:avLst/>
+          </a:prstGeom>
+          <a:solidFill>
+            <a:srgbClr val="CCFFFF"/>
+          </a:solidFill>
+          <a:ln>
+            <a:noFill/>
+          </a:ln>
+          <a:effectLst>
+            <a:outerShdw blurRad="107950" dist="12700" dir="5400000" algn="ctr">
+              <a:srgbClr val="000000"/>
+            </a:outerShdw>
+          </a:effectLst>
+          <a:scene3d>
+            <a:camera prst="orthographicFront">
+              <a:rot lat="0" lon="0" rev="0"/>
+            </a:camera>
+            <a:lightRig rig="soft" dir="t">
+              <a:rot lat="0" lon="0" rev="0"/>
+            </a:lightRig>
+          </a:scene3d>
+          <a:sp3d contourW="44450" prstMaterial="matte">
+            <a:bevelT w="63500" h="63500" prst="artDeco"/>
+            <a:contourClr>
+              <a:srgbClr val="FFFFFF"/>
+            </a:contourClr>
+          </a:sp3d>
+        </p:spPr>
+        <p:style>
+          <a:lnRef idx="1">
+            <a:schemeClr val="accent6"/>
+          </a:lnRef>
+          <a:fillRef idx="2">
+            <a:schemeClr val="accent6"/>
+          </a:fillRef>
+          <a:effectRef idx="1">
+            <a:schemeClr val="accent6"/>
+          </a:effectRef>
+          <a:fontRef idx="minor">
+            <a:schemeClr val="dk1"/>
+          </a:fontRef>
+        </p:style>
+        <p:txBody>
+          <a:bodyPr wrap="square" rtlCol="0">
+            <a:spAutoFit/>
+          </a:bodyPr>
+          <a:lstStyle/>
+          <a:p>
+            <a:pPr algn="ctr"/>
+            <a:r>
+              <a:rPr lang="en-US" sz="1600" b="1" dirty="0">
+                <a:solidFill>
+                  <a:schemeClr val="tx1"/>
+                </a:solidFill>
+              </a:rPr>
+              <a:t>ML-based, </a:t>
+            </a:r>
+          </a:p>
+          <a:p>
+            <a:pPr algn="ctr"/>
+            <a:r>
+              <a:rPr lang="en-US" sz="1600" b="1" dirty="0">
+                <a:solidFill>
+                  <a:schemeClr val="tx1"/>
+                </a:solidFill>
+              </a:rPr>
+              <a:t>Neural Program Analysis Infrastructure</a:t>
+            </a:r>
+          </a:p>
+        </p:txBody>
+      </p:sp>
+      <p:sp>
+        <p:nvSpPr>
+          <p:cNvPr id="48" name="TextBox 47">
+            <a:extLst>
+              <a:ext uri="{FF2B5EF4-FFF2-40B4-BE49-F238E27FC236}">
+                <a16:creationId xmlns:a16="http://schemas.microsoft.com/office/drawing/2014/main" id="{32EF05D2-AE4D-37D3-D03A-B33E0F885801}"/>
+              </a:ext>
+            </a:extLst>
+          </p:cNvPr>
+          <p:cNvSpPr txBox="1"/>
+          <p:nvPr/>
+        </p:nvSpPr>
+        <p:spPr>
+          <a:xfrm>
+            <a:off x="6944849" y="2928162"/>
+            <a:ext cx="1558756" cy="338554"/>
+          </a:xfrm>
+          <a:prstGeom prst="rect">
+            <a:avLst/>
+          </a:prstGeom>
+          <a:noFill/>
+          <a:ln>
+            <a:noFill/>
+          </a:ln>
+        </p:spPr>
+        <p:style>
+          <a:lnRef idx="0">
+            <a:scrgbClr r="0" g="0" b="0"/>
+          </a:lnRef>
+          <a:fillRef idx="0">
+            <a:scrgbClr r="0" g="0" b="0"/>
+          </a:fillRef>
+          <a:effectRef idx="0">
+            <a:scrgbClr r="0" g="0" b="0"/>
+          </a:effectRef>
+          <a:fontRef idx="minor">
+            <a:schemeClr val="lt1"/>
+          </a:fontRef>
+        </p:style>
+        <p:txBody>
+          <a:bodyPr wrap="square" rtlCol="0">
+            <a:spAutoFit/>
+          </a:bodyPr>
+          <a:lstStyle/>
+          <a:p>
+            <a:pPr algn="ctr"/>
+            <a:r>
+              <a:rPr lang="en-US" sz="1600" b="1" dirty="0" err="1">
+                <a:solidFill>
+                  <a:srgbClr val="FF0000"/>
+                </a:solidFill>
+              </a:rPr>
+              <a:t>NeuralPPA</a:t>
+            </a:r>
+            <a:endParaRPr lang="en-US" sz="1600" b="1" dirty="0">
+              <a:solidFill>
+                <a:srgbClr val="FF0000"/>
+              </a:solidFill>
+            </a:endParaRPr>
+          </a:p>
+        </p:txBody>
+      </p:sp>
+      <p:sp>
+        <p:nvSpPr>
+          <p:cNvPr id="1027" name="TextBox 1026">
+            <a:extLst>
+              <a:ext uri="{FF2B5EF4-FFF2-40B4-BE49-F238E27FC236}">
+                <a16:creationId xmlns:a16="http://schemas.microsoft.com/office/drawing/2014/main" id="{8AD6FD9F-7416-19B3-8754-5F1106F99619}"/>
+              </a:ext>
+            </a:extLst>
+          </p:cNvPr>
+          <p:cNvSpPr txBox="1"/>
+          <p:nvPr/>
+        </p:nvSpPr>
+        <p:spPr>
+          <a:xfrm>
+            <a:off x="1068863" y="205015"/>
+            <a:ext cx="2875403" cy="584775"/>
+          </a:xfrm>
+          <a:prstGeom prst="rect">
+            <a:avLst/>
+          </a:prstGeom>
+          <a:solidFill>
+            <a:srgbClr val="CCFFFF"/>
+          </a:solidFill>
+          <a:ln>
+            <a:noFill/>
+          </a:ln>
+          <a:effectLst>
+            <a:outerShdw blurRad="107950" dist="12700" dir="5400000" algn="ctr">
+              <a:srgbClr val="000000"/>
+            </a:outerShdw>
+          </a:effectLst>
+          <a:scene3d>
+            <a:camera prst="orthographicFront">
+              <a:rot lat="0" lon="0" rev="0"/>
+            </a:camera>
+            <a:lightRig rig="soft" dir="t">
+              <a:rot lat="0" lon="0" rev="0"/>
+            </a:lightRig>
+          </a:scene3d>
+          <a:sp3d contourW="44450" prstMaterial="matte">
+            <a:bevelT w="63500" h="63500" prst="artDeco"/>
+            <a:contourClr>
+              <a:srgbClr val="FFFFFF"/>
+            </a:contourClr>
+          </a:sp3d>
+        </p:spPr>
+        <p:style>
+          <a:lnRef idx="1">
+            <a:schemeClr val="accent6"/>
+          </a:lnRef>
+          <a:fillRef idx="2">
+            <a:schemeClr val="accent6"/>
+          </a:fillRef>
+          <a:effectRef idx="1">
+            <a:schemeClr val="accent6"/>
+          </a:effectRef>
+          <a:fontRef idx="minor">
+            <a:schemeClr val="dk1"/>
+          </a:fontRef>
+        </p:style>
+        <p:txBody>
+          <a:bodyPr wrap="square" rtlCol="0">
+            <a:spAutoFit/>
+          </a:bodyPr>
+          <a:lstStyle/>
+          <a:p>
+            <a:pPr algn="ctr"/>
+            <a:r>
+              <a:rPr lang="en-US" sz="1600" b="1" dirty="0">
+                <a:solidFill>
+                  <a:schemeClr val="tx1"/>
+                </a:solidFill>
+              </a:rPr>
+              <a:t>Partial AST Building</a:t>
+            </a:r>
+          </a:p>
+          <a:p>
+            <a:pPr algn="ctr"/>
+            <a:r>
+              <a:rPr lang="en-US" sz="1600" b="1" dirty="0">
+                <a:solidFill>
+                  <a:schemeClr val="tx1"/>
+                </a:solidFill>
+              </a:rPr>
+              <a:t>Syntactic Type Tagging</a:t>
+            </a:r>
+          </a:p>
+        </p:txBody>
+      </p:sp>
+      <p:sp>
+        <p:nvSpPr>
+          <p:cNvPr id="1032" name="TextBox 1031">
+            <a:extLst>
+              <a:ext uri="{FF2B5EF4-FFF2-40B4-BE49-F238E27FC236}">
+                <a16:creationId xmlns:a16="http://schemas.microsoft.com/office/drawing/2014/main" id="{F9FF1789-3444-4E67-B085-ECFBA744C456}"/>
+              </a:ext>
+            </a:extLst>
+          </p:cNvPr>
+          <p:cNvSpPr txBox="1"/>
+          <p:nvPr/>
+        </p:nvSpPr>
+        <p:spPr>
+          <a:xfrm>
+            <a:off x="1064277" y="1033599"/>
+            <a:ext cx="2875403" cy="830997"/>
+          </a:xfrm>
+          <a:prstGeom prst="rect">
+            <a:avLst/>
+          </a:prstGeom>
+          <a:solidFill>
+            <a:srgbClr val="CCFFFF"/>
+          </a:solidFill>
+          <a:ln>
+            <a:noFill/>
+          </a:ln>
+          <a:effectLst>
+            <a:outerShdw blurRad="107950" dist="12700" dir="5400000" algn="ctr">
+              <a:srgbClr val="000000"/>
+            </a:outerShdw>
+          </a:effectLst>
+          <a:scene3d>
+            <a:camera prst="orthographicFront">
+              <a:rot lat="0" lon="0" rev="0"/>
+            </a:camera>
+            <a:lightRig rig="soft" dir="t">
+              <a:rot lat="0" lon="0" rev="0"/>
+            </a:lightRig>
+          </a:scene3d>
+          <a:sp3d contourW="44450" prstMaterial="matte">
+            <a:bevelT w="63500" h="63500" prst="artDeco"/>
+            <a:contourClr>
+              <a:srgbClr val="FFFFFF"/>
+            </a:contourClr>
+          </a:sp3d>
+        </p:spPr>
+        <p:style>
+          <a:lnRef idx="1">
+            <a:schemeClr val="accent6"/>
+          </a:lnRef>
+          <a:fillRef idx="2">
+            <a:schemeClr val="accent6"/>
+          </a:fillRef>
+          <a:effectRef idx="1">
+            <a:schemeClr val="accent6"/>
+          </a:effectRef>
+          <a:fontRef idx="minor">
+            <a:schemeClr val="dk1"/>
+          </a:fontRef>
+        </p:style>
+        <p:txBody>
+          <a:bodyPr wrap="square" rtlCol="0">
+            <a:spAutoFit/>
+          </a:bodyPr>
+          <a:lstStyle/>
+          <a:p>
+            <a:pPr algn="ctr"/>
+            <a:r>
+              <a:rPr lang="en-US" sz="1600" b="1" dirty="0">
+                <a:solidFill>
+                  <a:schemeClr val="tx1"/>
+                </a:solidFill>
+              </a:rPr>
+              <a:t>External-Library Identification</a:t>
+            </a:r>
+          </a:p>
+          <a:p>
+            <a:pPr algn="ctr"/>
+            <a:r>
+              <a:rPr lang="en-US" sz="1600" b="1" dirty="0">
+                <a:solidFill>
+                  <a:schemeClr val="tx1"/>
+                </a:solidFill>
+              </a:rPr>
+              <a:t>Neural Type Inference</a:t>
+            </a:r>
+          </a:p>
+          <a:p>
+            <a:pPr algn="ctr"/>
+            <a:r>
+              <a:rPr lang="en-US" sz="1600" b="1" dirty="0">
+                <a:solidFill>
+                  <a:schemeClr val="tx1"/>
+                </a:solidFill>
+              </a:rPr>
+              <a:t>Neural Dependence Analysis</a:t>
+            </a:r>
+          </a:p>
+        </p:txBody>
+      </p:sp>
+      <p:sp>
+        <p:nvSpPr>
+          <p:cNvPr id="1040" name="TextBox 1039">
+            <a:extLst>
+              <a:ext uri="{FF2B5EF4-FFF2-40B4-BE49-F238E27FC236}">
+                <a16:creationId xmlns:a16="http://schemas.microsoft.com/office/drawing/2014/main" id="{19FD578D-2872-CABD-033C-C7CC06CA6462}"/>
+              </a:ext>
+            </a:extLst>
+          </p:cNvPr>
+          <p:cNvSpPr txBox="1"/>
+          <p:nvPr/>
+        </p:nvSpPr>
+        <p:spPr>
+          <a:xfrm>
+            <a:off x="1071127" y="2209929"/>
+            <a:ext cx="2875403" cy="584775"/>
+          </a:xfrm>
+          <a:prstGeom prst="rect">
+            <a:avLst/>
+          </a:prstGeom>
+          <a:solidFill>
+            <a:srgbClr val="CCFFFF"/>
+          </a:solidFill>
+          <a:ln>
+            <a:noFill/>
+          </a:ln>
+          <a:effectLst>
+            <a:outerShdw blurRad="107950" dist="12700" dir="5400000" algn="ctr">
+              <a:srgbClr val="000000"/>
+            </a:outerShdw>
+          </a:effectLst>
+          <a:scene3d>
+            <a:camera prst="orthographicFront">
+              <a:rot lat="0" lon="0" rev="0"/>
+            </a:camera>
+            <a:lightRig rig="soft" dir="t">
+              <a:rot lat="0" lon="0" rev="0"/>
+            </a:lightRig>
+          </a:scene3d>
+          <a:sp3d contourW="44450" prstMaterial="matte">
+            <a:bevelT w="63500" h="63500" prst="artDeco"/>
+            <a:contourClr>
+              <a:srgbClr val="FFFFFF"/>
+            </a:contourClr>
+          </a:sp3d>
+        </p:spPr>
+        <p:style>
+          <a:lnRef idx="1">
+            <a:schemeClr val="accent6"/>
+          </a:lnRef>
+          <a:fillRef idx="2">
+            <a:schemeClr val="accent6"/>
+          </a:fillRef>
+          <a:effectRef idx="1">
+            <a:schemeClr val="accent6"/>
+          </a:effectRef>
+          <a:fontRef idx="minor">
+            <a:schemeClr val="dk1"/>
+          </a:fontRef>
+        </p:style>
+        <p:txBody>
+          <a:bodyPr wrap="square" rtlCol="0">
+            <a:spAutoFit/>
+          </a:bodyPr>
+          <a:lstStyle/>
+          <a:p>
+            <a:pPr algn="ctr"/>
+            <a:r>
+              <a:rPr lang="en-US" sz="1600" b="1" dirty="0">
+                <a:solidFill>
+                  <a:schemeClr val="tx1"/>
+                </a:solidFill>
+              </a:rPr>
+              <a:t>Neural Symbolic Execution</a:t>
+            </a:r>
+          </a:p>
+          <a:p>
+            <a:pPr algn="ctr"/>
+            <a:r>
+              <a:rPr lang="en-US" sz="1600" b="1" dirty="0">
+                <a:solidFill>
+                  <a:schemeClr val="tx1"/>
+                </a:solidFill>
+              </a:rPr>
+              <a:t>Symbolic Exec. Trace Modeling</a:t>
+            </a:r>
+          </a:p>
+        </p:txBody>
+      </p:sp>
+      <p:cxnSp>
+        <p:nvCxnSpPr>
+          <p:cNvPr id="1052" name="Straight Connector 1051">
+            <a:extLst>
+              <a:ext uri="{FF2B5EF4-FFF2-40B4-BE49-F238E27FC236}">
+                <a16:creationId xmlns:a16="http://schemas.microsoft.com/office/drawing/2014/main" id="{21888C84-774B-CD16-59DB-B21EB1191E6B}"/>
+              </a:ext>
+            </a:extLst>
+          </p:cNvPr>
+          <p:cNvCxnSpPr>
+            <a:cxnSpLocks/>
+            <a:endCxn id="48" idx="0"/>
+          </p:cNvCxnSpPr>
+          <p:nvPr/>
+        </p:nvCxnSpPr>
+        <p:spPr>
+          <a:xfrm flipH="1">
+            <a:off x="7724227" y="492891"/>
+            <a:ext cx="7957" cy="2435271"/>
+          </a:xfrm>
+          <a:prstGeom prst="line">
+            <a:avLst/>
+          </a:prstGeom>
+        </p:spPr>
+        <p:style>
+          <a:lnRef idx="1">
+            <a:schemeClr val="accent1"/>
+          </a:lnRef>
+          <a:fillRef idx="0">
+            <a:schemeClr val="accent1"/>
+          </a:fillRef>
+          <a:effectRef idx="0">
+            <a:schemeClr val="accent1"/>
+          </a:effectRef>
+          <a:fontRef idx="minor">
+            <a:schemeClr val="tx1"/>
+          </a:fontRef>
+        </p:style>
+      </p:cxnSp>
+      <p:grpSp>
+        <p:nvGrpSpPr>
+          <p:cNvPr id="1069" name="Group 1068">
+            <a:extLst>
+              <a:ext uri="{FF2B5EF4-FFF2-40B4-BE49-F238E27FC236}">
+                <a16:creationId xmlns:a16="http://schemas.microsoft.com/office/drawing/2014/main" id="{369CF8A0-8921-5D66-51C8-49CA5610579F}"/>
+              </a:ext>
+            </a:extLst>
+          </p:cNvPr>
+          <p:cNvGrpSpPr/>
+          <p:nvPr/>
+        </p:nvGrpSpPr>
+        <p:grpSpPr>
+          <a:xfrm>
+            <a:off x="3967241" y="186765"/>
+            <a:ext cx="3764943" cy="621276"/>
+            <a:chOff x="4706854" y="186765"/>
+            <a:chExt cx="3734737" cy="621276"/>
+          </a:xfrm>
+        </p:grpSpPr>
+        <p:sp>
+          <p:nvSpPr>
+            <p:cNvPr id="1048" name="Oval 1047">
+              <a:extLst>
+                <a:ext uri="{FF2B5EF4-FFF2-40B4-BE49-F238E27FC236}">
+                  <a16:creationId xmlns:a16="http://schemas.microsoft.com/office/drawing/2014/main" id="{B3F0448D-1B52-5F3C-1506-4FA1E43139B0}"/>
+                </a:ext>
+              </a:extLst>
+            </p:cNvPr>
+            <p:cNvSpPr/>
+            <p:nvPr/>
+          </p:nvSpPr>
+          <p:spPr>
+            <a:xfrm>
+              <a:off x="5365172" y="186765"/>
+              <a:ext cx="2094827" cy="621276"/>
+            </a:xfrm>
+            <a:prstGeom prst="ellipse">
+              <a:avLst/>
+            </a:prstGeom>
+            <a:gradFill flip="none" rotWithShape="1">
+              <a:gsLst>
+                <a:gs pos="0">
+                  <a:schemeClr val="accent5">
+                    <a:lumMod val="67000"/>
+                  </a:schemeClr>
+                </a:gs>
+                <a:gs pos="48000">
+                  <a:schemeClr val="accent5">
+                    <a:lumMod val="97000"/>
+                    <a:lumOff val="3000"/>
+                  </a:schemeClr>
+                </a:gs>
+                <a:gs pos="100000">
+                  <a:schemeClr val="accent5">
+                    <a:lumMod val="60000"/>
+                    <a:lumOff val="40000"/>
+                  </a:schemeClr>
+                </a:gs>
+              </a:gsLst>
+              <a:lin ang="16200000" scaled="1"/>
+              <a:tileRect/>
+            </a:gradFill>
+            <a:ln>
+              <a:noFill/>
+            </a:ln>
+          </p:spPr>
+          <p:style>
+            <a:lnRef idx="0">
+              <a:scrgbClr r="0" g="0" b="0"/>
+            </a:lnRef>
+            <a:fillRef idx="0">
+              <a:scrgbClr r="0" g="0" b="0"/>
+            </a:fillRef>
+            <a:effectRef idx="0">
+              <a:scrgbClr r="0" g="0" b="0"/>
+            </a:effectRef>
+            <a:fontRef idx="minor">
+              <a:schemeClr val="lt1"/>
+            </a:fontRef>
+          </p:style>
+          <p:txBody>
+            <a:bodyPr rtlCol="0" anchor="ctr"/>
+            <a:lstStyle/>
+            <a:p>
+              <a:pPr algn="ctr"/>
+              <a:r>
+                <a:rPr lang="en-US" dirty="0">
+                  <a:solidFill>
+                    <a:schemeClr val="tx1"/>
+                  </a:solidFill>
+                </a:rPr>
+                <a:t>Structure Level</a:t>
+              </a:r>
+            </a:p>
+          </p:txBody>
+        </p:sp>
+        <p:cxnSp>
+          <p:nvCxnSpPr>
+            <p:cNvPr id="1057" name="Straight Arrow Connector 1056">
+              <a:extLst>
+                <a:ext uri="{FF2B5EF4-FFF2-40B4-BE49-F238E27FC236}">
+                  <a16:creationId xmlns:a16="http://schemas.microsoft.com/office/drawing/2014/main" id="{D4245398-450C-B63F-3915-8A664B5EF074}"/>
+                </a:ext>
+              </a:extLst>
+            </p:cNvPr>
+            <p:cNvCxnSpPr>
+              <a:cxnSpLocks/>
+              <a:endCxn id="1048" idx="6"/>
+            </p:cNvCxnSpPr>
+            <p:nvPr/>
+          </p:nvCxnSpPr>
+          <p:spPr>
+            <a:xfrm flipH="1">
+              <a:off x="7459999" y="497403"/>
+              <a:ext cx="981592" cy="0"/>
+            </a:xfrm>
+            <a:prstGeom prst="straightConnector1">
+              <a:avLst/>
+            </a:prstGeom>
+            <a:ln>
+              <a:tailEnd type="triangle"/>
+            </a:ln>
+          </p:spPr>
+          <p:style>
+            <a:lnRef idx="1">
+              <a:schemeClr val="accent1"/>
+            </a:lnRef>
+            <a:fillRef idx="0">
+              <a:schemeClr val="accent1"/>
+            </a:fillRef>
+            <a:effectRef idx="0">
+              <a:schemeClr val="accent1"/>
+            </a:effectRef>
+            <a:fontRef idx="minor">
+              <a:schemeClr val="tx1"/>
+            </a:fontRef>
+          </p:style>
+        </p:cxnSp>
+        <p:cxnSp>
+          <p:nvCxnSpPr>
+            <p:cNvPr id="1065" name="Straight Arrow Connector 1064">
+              <a:extLst>
+                <a:ext uri="{FF2B5EF4-FFF2-40B4-BE49-F238E27FC236}">
+                  <a16:creationId xmlns:a16="http://schemas.microsoft.com/office/drawing/2014/main" id="{C016017B-7914-1757-7E30-4D723ECA2E46}"/>
+                </a:ext>
+              </a:extLst>
+            </p:cNvPr>
+            <p:cNvCxnSpPr>
+              <a:stCxn id="1048" idx="2"/>
+              <a:endCxn id="1027" idx="3"/>
+            </p:cNvCxnSpPr>
+            <p:nvPr/>
+          </p:nvCxnSpPr>
+          <p:spPr>
+            <a:xfrm flipH="1">
+              <a:off x="4706854" y="497403"/>
+              <a:ext cx="658318" cy="0"/>
+            </a:xfrm>
+            <a:prstGeom prst="straightConnector1">
+              <a:avLst/>
+            </a:prstGeom>
+            <a:ln>
+              <a:tailEnd type="triangle"/>
+            </a:ln>
+          </p:spPr>
+          <p:style>
+            <a:lnRef idx="1">
+              <a:schemeClr val="accent1"/>
+            </a:lnRef>
+            <a:fillRef idx="0">
+              <a:schemeClr val="accent1"/>
+            </a:fillRef>
+            <a:effectRef idx="0">
+              <a:schemeClr val="accent1"/>
+            </a:effectRef>
+            <a:fontRef idx="minor">
+              <a:schemeClr val="tx1"/>
+            </a:fontRef>
+          </p:style>
+        </p:cxnSp>
+      </p:grpSp>
+      <p:grpSp>
+        <p:nvGrpSpPr>
+          <p:cNvPr id="1080" name="Group 1079">
+            <a:extLst>
+              <a:ext uri="{FF2B5EF4-FFF2-40B4-BE49-F238E27FC236}">
+                <a16:creationId xmlns:a16="http://schemas.microsoft.com/office/drawing/2014/main" id="{AF191F0A-D54F-7B5E-D9BE-2D6A58379658}"/>
+              </a:ext>
+            </a:extLst>
+          </p:cNvPr>
+          <p:cNvGrpSpPr/>
+          <p:nvPr/>
+        </p:nvGrpSpPr>
+        <p:grpSpPr>
+          <a:xfrm>
+            <a:off x="3944265" y="1160516"/>
+            <a:ext cx="3787919" cy="621276"/>
+            <a:chOff x="4684061" y="186765"/>
+            <a:chExt cx="3757530" cy="621276"/>
+          </a:xfrm>
+        </p:grpSpPr>
+        <p:sp>
+          <p:nvSpPr>
+            <p:cNvPr id="1081" name="Oval 1080">
+              <a:extLst>
+                <a:ext uri="{FF2B5EF4-FFF2-40B4-BE49-F238E27FC236}">
+                  <a16:creationId xmlns:a16="http://schemas.microsoft.com/office/drawing/2014/main" id="{F2D258C9-927B-7D4A-2112-11E875729560}"/>
+                </a:ext>
+              </a:extLst>
+            </p:cNvPr>
+            <p:cNvSpPr/>
+            <p:nvPr/>
+          </p:nvSpPr>
+          <p:spPr>
+            <a:xfrm>
+              <a:off x="5365172" y="186765"/>
+              <a:ext cx="2094827" cy="621276"/>
+            </a:xfrm>
+            <a:prstGeom prst="ellipse">
+              <a:avLst/>
+            </a:prstGeom>
+            <a:gradFill flip="none" rotWithShape="1">
+              <a:gsLst>
+                <a:gs pos="0">
+                  <a:schemeClr val="accent5">
+                    <a:lumMod val="67000"/>
+                  </a:schemeClr>
+                </a:gs>
+                <a:gs pos="48000">
+                  <a:schemeClr val="accent5">
+                    <a:lumMod val="97000"/>
+                    <a:lumOff val="3000"/>
+                  </a:schemeClr>
+                </a:gs>
+                <a:gs pos="100000">
+                  <a:schemeClr val="accent5">
+                    <a:lumMod val="60000"/>
+                    <a:lumOff val="40000"/>
+                  </a:schemeClr>
+                </a:gs>
+              </a:gsLst>
+              <a:lin ang="16200000" scaled="1"/>
+              <a:tileRect/>
+            </a:gradFill>
+            <a:ln>
+              <a:noFill/>
+            </a:ln>
+          </p:spPr>
+          <p:style>
+            <a:lnRef idx="0">
+              <a:scrgbClr r="0" g="0" b="0"/>
+            </a:lnRef>
+            <a:fillRef idx="0">
+              <a:scrgbClr r="0" g="0" b="0"/>
+            </a:fillRef>
+            <a:effectRef idx="0">
+              <a:scrgbClr r="0" g="0" b="0"/>
+            </a:effectRef>
+            <a:fontRef idx="minor">
+              <a:schemeClr val="lt1"/>
+            </a:fontRef>
+          </p:style>
+          <p:txBody>
+            <a:bodyPr rtlCol="0" anchor="ctr"/>
+            <a:lstStyle/>
+            <a:p>
+              <a:pPr algn="ctr"/>
+              <a:r>
+                <a:rPr lang="en-US" dirty="0">
+                  <a:solidFill>
+                    <a:schemeClr val="tx1"/>
+                  </a:solidFill>
+                </a:rPr>
+                <a:t>Semantic Level</a:t>
+              </a:r>
+            </a:p>
+          </p:txBody>
+        </p:sp>
+        <p:cxnSp>
+          <p:nvCxnSpPr>
+            <p:cNvPr id="1082" name="Straight Arrow Connector 1081">
+              <a:extLst>
+                <a:ext uri="{FF2B5EF4-FFF2-40B4-BE49-F238E27FC236}">
+                  <a16:creationId xmlns:a16="http://schemas.microsoft.com/office/drawing/2014/main" id="{E7D4DD41-1A3D-50D3-166D-D6122126F044}"/>
+                </a:ext>
+              </a:extLst>
+            </p:cNvPr>
+            <p:cNvCxnSpPr>
+              <a:cxnSpLocks/>
+              <a:endCxn id="1081" idx="6"/>
+            </p:cNvCxnSpPr>
+            <p:nvPr/>
+          </p:nvCxnSpPr>
+          <p:spPr>
+            <a:xfrm flipH="1">
+              <a:off x="7459999" y="497403"/>
+              <a:ext cx="981592" cy="0"/>
+            </a:xfrm>
+            <a:prstGeom prst="straightConnector1">
+              <a:avLst/>
+            </a:prstGeom>
+            <a:ln>
+              <a:tailEnd type="triangle"/>
+            </a:ln>
+          </p:spPr>
+          <p:style>
+            <a:lnRef idx="1">
+              <a:schemeClr val="accent1"/>
+            </a:lnRef>
+            <a:fillRef idx="0">
+              <a:schemeClr val="accent1"/>
+            </a:fillRef>
+            <a:effectRef idx="0">
+              <a:schemeClr val="accent1"/>
+            </a:effectRef>
+            <a:fontRef idx="minor">
+              <a:schemeClr val="tx1"/>
+            </a:fontRef>
+          </p:style>
+        </p:cxnSp>
+        <p:cxnSp>
+          <p:nvCxnSpPr>
+            <p:cNvPr id="1083" name="Straight Arrow Connector 1082">
+              <a:extLst>
+                <a:ext uri="{FF2B5EF4-FFF2-40B4-BE49-F238E27FC236}">
+                  <a16:creationId xmlns:a16="http://schemas.microsoft.com/office/drawing/2014/main" id="{F326E0A9-20D5-0057-9CA8-6277B494CCAF}"/>
+                </a:ext>
+              </a:extLst>
+            </p:cNvPr>
+            <p:cNvCxnSpPr>
+              <a:stCxn id="1081" idx="2"/>
+            </p:cNvCxnSpPr>
+            <p:nvPr/>
+          </p:nvCxnSpPr>
+          <p:spPr>
+            <a:xfrm flipH="1">
+              <a:off x="4684061" y="497403"/>
+              <a:ext cx="681111" cy="0"/>
+            </a:xfrm>
+            <a:prstGeom prst="straightConnector1">
+              <a:avLst/>
+            </a:prstGeom>
+            <a:ln>
+              <a:tailEnd type="triangle"/>
+            </a:ln>
+          </p:spPr>
+          <p:style>
+            <a:lnRef idx="1">
+              <a:schemeClr val="accent1"/>
+            </a:lnRef>
+            <a:fillRef idx="0">
+              <a:schemeClr val="accent1"/>
+            </a:fillRef>
+            <a:effectRef idx="0">
+              <a:schemeClr val="accent1"/>
+            </a:effectRef>
+            <a:fontRef idx="minor">
+              <a:schemeClr val="tx1"/>
+            </a:fontRef>
+          </p:style>
+        </p:cxnSp>
+      </p:grpSp>
+      <p:grpSp>
+        <p:nvGrpSpPr>
+          <p:cNvPr id="1084" name="Group 1083">
+            <a:extLst>
+              <a:ext uri="{FF2B5EF4-FFF2-40B4-BE49-F238E27FC236}">
+                <a16:creationId xmlns:a16="http://schemas.microsoft.com/office/drawing/2014/main" id="{C6ED4585-D184-6B26-04C2-6BA115AD409D}"/>
+              </a:ext>
+            </a:extLst>
+          </p:cNvPr>
+          <p:cNvGrpSpPr/>
+          <p:nvPr/>
+        </p:nvGrpSpPr>
+        <p:grpSpPr>
+          <a:xfrm>
+            <a:off x="3930551" y="2174089"/>
+            <a:ext cx="3787919" cy="621276"/>
+            <a:chOff x="4684061" y="186765"/>
+            <a:chExt cx="3757530" cy="621276"/>
+          </a:xfrm>
+        </p:grpSpPr>
+        <p:sp>
+          <p:nvSpPr>
+            <p:cNvPr id="1085" name="Oval 1084">
+              <a:extLst>
+                <a:ext uri="{FF2B5EF4-FFF2-40B4-BE49-F238E27FC236}">
+                  <a16:creationId xmlns:a16="http://schemas.microsoft.com/office/drawing/2014/main" id="{F25AEA8F-A59E-B401-5524-2F890F507CF0}"/>
+                </a:ext>
+              </a:extLst>
+            </p:cNvPr>
+            <p:cNvSpPr/>
+            <p:nvPr/>
+          </p:nvSpPr>
+          <p:spPr>
+            <a:xfrm>
+              <a:off x="5365172" y="186765"/>
+              <a:ext cx="2094827" cy="621276"/>
+            </a:xfrm>
+            <a:prstGeom prst="ellipse">
+              <a:avLst/>
+            </a:prstGeom>
+            <a:gradFill flip="none" rotWithShape="1">
+              <a:gsLst>
+                <a:gs pos="0">
+                  <a:schemeClr val="accent5">
+                    <a:lumMod val="67000"/>
+                  </a:schemeClr>
+                </a:gs>
+                <a:gs pos="48000">
+                  <a:schemeClr val="accent5">
+                    <a:lumMod val="97000"/>
+                    <a:lumOff val="3000"/>
+                  </a:schemeClr>
+                </a:gs>
+                <a:gs pos="100000">
+                  <a:schemeClr val="accent5">
+                    <a:lumMod val="60000"/>
+                    <a:lumOff val="40000"/>
+                  </a:schemeClr>
+                </a:gs>
+              </a:gsLst>
+              <a:lin ang="16200000" scaled="1"/>
+              <a:tileRect/>
+            </a:gradFill>
+            <a:ln>
+              <a:noFill/>
+            </a:ln>
+          </p:spPr>
+          <p:style>
+            <a:lnRef idx="0">
+              <a:scrgbClr r="0" g="0" b="0"/>
+            </a:lnRef>
+            <a:fillRef idx="0">
+              <a:scrgbClr r="0" g="0" b="0"/>
+            </a:fillRef>
+            <a:effectRef idx="0">
+              <a:scrgbClr r="0" g="0" b="0"/>
+            </a:effectRef>
+            <a:fontRef idx="minor">
+              <a:schemeClr val="lt1"/>
+            </a:fontRef>
+          </p:style>
+          <p:txBody>
+            <a:bodyPr rtlCol="0" anchor="ctr"/>
+            <a:lstStyle/>
+            <a:p>
+              <a:pPr algn="ctr"/>
+              <a:r>
+                <a:rPr lang="en-US" dirty="0">
+                  <a:solidFill>
+                    <a:schemeClr val="tx1"/>
+                  </a:solidFill>
+                </a:rPr>
+                <a:t>Symbolic Execution</a:t>
+              </a:r>
+            </a:p>
+          </p:txBody>
+        </p:sp>
+        <p:cxnSp>
+          <p:nvCxnSpPr>
+            <p:cNvPr id="1086" name="Straight Arrow Connector 1085">
+              <a:extLst>
+                <a:ext uri="{FF2B5EF4-FFF2-40B4-BE49-F238E27FC236}">
+                  <a16:creationId xmlns:a16="http://schemas.microsoft.com/office/drawing/2014/main" id="{11C390D5-C7DE-208B-EA76-2FE99DB46976}"/>
+                </a:ext>
+              </a:extLst>
+            </p:cNvPr>
+            <p:cNvCxnSpPr>
+              <a:cxnSpLocks/>
+              <a:endCxn id="1085" idx="6"/>
+            </p:cNvCxnSpPr>
+            <p:nvPr/>
+          </p:nvCxnSpPr>
+          <p:spPr>
+            <a:xfrm flipH="1">
+              <a:off x="7459999" y="497403"/>
+              <a:ext cx="981592" cy="0"/>
+            </a:xfrm>
+            <a:prstGeom prst="straightConnector1">
+              <a:avLst/>
+            </a:prstGeom>
+            <a:ln>
+              <a:tailEnd type="triangle"/>
+            </a:ln>
+          </p:spPr>
+          <p:style>
+            <a:lnRef idx="1">
+              <a:schemeClr val="accent1"/>
+            </a:lnRef>
+            <a:fillRef idx="0">
+              <a:schemeClr val="accent1"/>
+            </a:fillRef>
+            <a:effectRef idx="0">
+              <a:schemeClr val="accent1"/>
+            </a:effectRef>
+            <a:fontRef idx="minor">
+              <a:schemeClr val="tx1"/>
+            </a:fontRef>
+          </p:style>
+        </p:cxnSp>
+        <p:cxnSp>
+          <p:nvCxnSpPr>
+            <p:cNvPr id="1087" name="Straight Arrow Connector 1086">
+              <a:extLst>
+                <a:ext uri="{FF2B5EF4-FFF2-40B4-BE49-F238E27FC236}">
+                  <a16:creationId xmlns:a16="http://schemas.microsoft.com/office/drawing/2014/main" id="{FF01E51E-7CC3-C471-5777-5E9E0042120E}"/>
+                </a:ext>
+              </a:extLst>
+            </p:cNvPr>
+            <p:cNvCxnSpPr>
+              <a:stCxn id="1085" idx="2"/>
+            </p:cNvCxnSpPr>
+            <p:nvPr/>
+          </p:nvCxnSpPr>
+          <p:spPr>
+            <a:xfrm flipH="1">
+              <a:off x="4684061" y="497403"/>
+              <a:ext cx="681111" cy="0"/>
+            </a:xfrm>
+            <a:prstGeom prst="straightConnector1">
+              <a:avLst/>
+            </a:prstGeom>
+            <a:ln>
+              <a:tailEnd type="triangle"/>
+            </a:ln>
+          </p:spPr>
+          <p:style>
+            <a:lnRef idx="1">
+              <a:schemeClr val="accent1"/>
+            </a:lnRef>
+            <a:fillRef idx="0">
+              <a:schemeClr val="accent1"/>
+            </a:fillRef>
+            <a:effectRef idx="0">
+              <a:schemeClr val="accent1"/>
+            </a:effectRef>
+            <a:fontRef idx="minor">
+              <a:schemeClr val="tx1"/>
+            </a:fontRef>
+          </p:style>
+        </p:cxnSp>
+      </p:grpSp>
+      <p:sp>
+        <p:nvSpPr>
+          <p:cNvPr id="2" name="TextBox 1">
+            <a:extLst>
+              <a:ext uri="{FF2B5EF4-FFF2-40B4-BE49-F238E27FC236}">
+                <a16:creationId xmlns:a16="http://schemas.microsoft.com/office/drawing/2014/main" id="{916B0C7A-1B9A-B42E-ED9C-FECD12A7C8D8}"/>
+              </a:ext>
+            </a:extLst>
+          </p:cNvPr>
+          <p:cNvSpPr txBox="1"/>
+          <p:nvPr/>
+        </p:nvSpPr>
+        <p:spPr>
+          <a:xfrm>
+            <a:off x="10093457" y="6311129"/>
+            <a:ext cx="343364" cy="369332"/>
+          </a:xfrm>
+          <a:prstGeom prst="rect">
+            <a:avLst/>
+          </a:prstGeom>
+          <a:noFill/>
+        </p:spPr>
+        <p:txBody>
+          <a:bodyPr wrap="none" rtlCol="0">
+            <a:spAutoFit/>
+          </a:bodyPr>
+          <a:lstStyle/>
+          <a:p>
+            <a:r>
+              <a:rPr lang="en-US" dirty="0"/>
+              <a:t>…</a:t>
+            </a:r>
+          </a:p>
+        </p:txBody>
+      </p:sp>
+      <p:sp>
+        <p:nvSpPr>
+          <p:cNvPr id="3" name="Arrow: Right 2">
+            <a:extLst>
+              <a:ext uri="{FF2B5EF4-FFF2-40B4-BE49-F238E27FC236}">
+                <a16:creationId xmlns:a16="http://schemas.microsoft.com/office/drawing/2014/main" id="{F413AB4D-5369-0529-7EE5-0DFB599DE7E9}"/>
+              </a:ext>
+            </a:extLst>
+          </p:cNvPr>
+          <p:cNvSpPr/>
+          <p:nvPr/>
+        </p:nvSpPr>
+        <p:spPr>
+          <a:xfrm>
+            <a:off x="8895854" y="3599809"/>
+            <a:ext cx="312534" cy="207974"/>
+          </a:xfrm>
+          <a:prstGeom prst="rightArrow">
+            <a:avLst/>
+          </a:prstGeom>
+          <a:noFill/>
+        </p:spPr>
+        <p:style>
+          <a:lnRef idx="2">
+            <a:schemeClr val="accent1">
+              <a:shade val="50000"/>
+            </a:schemeClr>
+          </a:lnRef>
+          <a:fillRef idx="1">
+            <a:schemeClr val="accent1"/>
+          </a:fillRef>
+          <a:effectRef idx="0">
+            <a:schemeClr val="accent1"/>
+          </a:effectRef>
+          <a:fontRef idx="minor">
+            <a:schemeClr val="lt1"/>
+          </a:fontRef>
+        </p:style>
+        <p:txBody>
+          <a:bodyPr rtlCol="0" anchor="ctr"/>
+          <a:lstStyle/>
+          <a:p>
+            <a:pPr algn="ctr"/>
+            <a:endParaRPr lang="en-US"/>
+          </a:p>
+        </p:txBody>
+      </p:sp>
+    </p:spTree>
+    <p:extLst>
+      <p:ext uri="{BB962C8B-B14F-4D97-AF65-F5344CB8AC3E}">
+        <p14:creationId xmlns:p14="http://schemas.microsoft.com/office/powerpoint/2010/main" val="1914018766"/>
       </p:ext>
     </p:extLst>
   </p:cSld>

</xml_diff>